<commit_message>
Update plots for presentation.
</commit_message>
<xml_diff>
--- a/presentations/strategies_for_first_stage_reuse.pptx
+++ b/presentations/strategies_for_first_stage_reuse.pptx
@@ -120,6 +120,11 @@
       </a:defRPr>
     </a:lvl9pPr>
   </p:defaultTextStyle>
+  <p:extLst>
+    <p:ext uri="{EFAFB233-063F-42B5-8137-9DF3F51BA10A}">
+      <p15:sldGuideLst xmlns:p15="http://schemas.microsoft.com/office/powerpoint/2012/main"/>
+    </p:ext>
+  </p:extLst>
 </p:presentation>
 </file>
 
@@ -205,7 +210,7 @@
           <a:p>
             <a:fld id="{87F85518-7193-43B3-BB30-DCB687ABA441}" type="datetimeFigureOut">
               <a:rPr lang="en-US" smtClean="0"/>
-              <a:t>9/22/2018</a:t>
+              <a:t>9/23/2018</a:t>
             </a:fld>
             <a:endParaRPr lang="en-US"/>
           </a:p>
@@ -1812,7 +1817,6 @@
               <a:rPr lang="en-US" sz="2200" dirty="0"/>
               <a:t>2018-10-03</a:t>
             </a:r>
-            <a:endParaRPr lang="en-US" sz="2200" dirty="0"/>
           </a:p>
         </p:txBody>
       </p:sp>
@@ -2917,7 +2921,7 @@
       </p:grpSpPr>
       <p:pic>
         <p:nvPicPr>
-          <p:cNvPr id="8" name="Picture 7"/>
+          <p:cNvPr id="14" name="Picture 13"/>
           <p:cNvPicPr>
             <a:picLocks noChangeAspect="1"/>
           </p:cNvPicPr>
@@ -2937,8 +2941,37 @@
         </p:blipFill>
         <p:spPr>
           <a:xfrm>
-            <a:off x="574112" y="1269909"/>
-            <a:ext cx="5334000" cy="4572000"/>
+            <a:off x="6842745" y="911203"/>
+            <a:ext cx="4608576" cy="5486400"/>
+          </a:xfrm>
+          <a:prstGeom prst="rect">
+            <a:avLst/>
+          </a:prstGeom>
+        </p:spPr>
+      </p:pic>
+      <p:pic>
+        <p:nvPicPr>
+          <p:cNvPr id="3" name="Picture 2"/>
+          <p:cNvPicPr>
+            <a:picLocks noChangeAspect="1"/>
+          </p:cNvPicPr>
+          <p:nvPr/>
+        </p:nvPicPr>
+        <p:blipFill rotWithShape="1">
+          <a:blip r:embed="rId3" cstate="print">
+            <a:extLst>
+              <a:ext uri="{28A0092B-C50C-407E-A947-70E740481C1C}">
+                <a14:useLocalDpi xmlns:a14="http://schemas.microsoft.com/office/drawing/2010/main" val="0"/>
+              </a:ext>
+            </a:extLst>
+          </a:blip>
+          <a:srcRect t="9407"/>
+          <a:stretch/>
+        </p:blipFill>
+        <p:spPr>
+          <a:xfrm>
+            <a:off x="935721" y="911203"/>
+            <a:ext cx="5557158" cy="5537829"/>
           </a:xfrm>
           <a:prstGeom prst="rect">
             <a:avLst/>
@@ -2962,7 +2995,15 @@
           <a:p>
             <a:r>
               <a:rPr lang="en-US" dirty="0" smtClean="0"/>
-              <a:t>Reuse is only viable for medium – large launch vehicles</a:t>
+              <a:t>Reuse is only viable for </a:t>
+            </a:r>
+            <a:r>
+              <a:rPr lang="en-US" dirty="0" smtClean="0"/>
+              <a:t>medium to heavy launch </a:t>
+            </a:r>
+            <a:r>
+              <a:rPr lang="en-US" dirty="0" smtClean="0"/>
+              <a:t>vehicles</a:t>
             </a:r>
             <a:endParaRPr lang="en-US" dirty="0"/>
           </a:p>
@@ -2992,104 +3033,6 @@
           </a:p>
         </p:txBody>
       </p:sp>
-      <p:pic>
-        <p:nvPicPr>
-          <p:cNvPr id="5" name="Picture 4"/>
-          <p:cNvPicPr>
-            <a:picLocks noChangeAspect="1"/>
-          </p:cNvPicPr>
-          <p:nvPr/>
-        </p:nvPicPr>
-        <p:blipFill>
-          <a:blip r:embed="rId3">
-            <a:extLst>
-              <a:ext uri="{28A0092B-C50C-407E-A947-70E740481C1C}">
-                <a14:useLocalDpi xmlns:a14="http://schemas.microsoft.com/office/drawing/2010/main" val="0"/>
-              </a:ext>
-            </a:extLst>
-          </a:blip>
-          <a:stretch>
-            <a:fillRect/>
-          </a:stretch>
-        </p:blipFill>
-        <p:spPr>
-          <a:xfrm>
-            <a:off x="6457950" y="1062202"/>
-            <a:ext cx="4755094" cy="5273653"/>
-          </a:xfrm>
-          <a:prstGeom prst="rect">
-            <a:avLst/>
-          </a:prstGeom>
-        </p:spPr>
-      </p:pic>
-      <p:sp>
-        <p:nvSpPr>
-          <p:cNvPr id="6" name="TextBox 5"/>
-          <p:cNvSpPr txBox="1"/>
-          <p:nvPr/>
-        </p:nvSpPr>
-        <p:spPr>
-          <a:xfrm>
-            <a:off x="8558334" y="3186577"/>
-            <a:ext cx="737574" cy="369332"/>
-          </a:xfrm>
-          <a:prstGeom prst="rect">
-            <a:avLst/>
-          </a:prstGeom>
-          <a:noFill/>
-        </p:spPr>
-        <p:txBody>
-          <a:bodyPr wrap="none" rtlCol="0">
-            <a:spAutoFit/>
-          </a:bodyPr>
-          <a:lstStyle/>
-          <a:p>
-            <a:r>
-              <a:rPr lang="en-US" dirty="0" smtClean="0">
-                <a:solidFill>
-                  <a:srgbClr val="FF0000"/>
-                </a:solidFill>
-              </a:rPr>
-              <a:t>TODO</a:t>
-            </a:r>
-            <a:endParaRPr lang="en-US" dirty="0">
-              <a:solidFill>
-                <a:srgbClr val="FF0000"/>
-              </a:solidFill>
-            </a:endParaRPr>
-          </a:p>
-        </p:txBody>
-      </p:sp>
-      <p:pic>
-        <p:nvPicPr>
-          <p:cNvPr id="7" name="Picture 6"/>
-          <p:cNvPicPr>
-            <a:picLocks noChangeAspect="1"/>
-          </p:cNvPicPr>
-          <p:nvPr/>
-        </p:nvPicPr>
-        <p:blipFill>
-          <a:blip r:embed="rId4" cstate="print">
-            <a:extLst>
-              <a:ext uri="{28A0092B-C50C-407E-A947-70E740481C1C}">
-                <a14:useLocalDpi xmlns:a14="http://schemas.microsoft.com/office/drawing/2010/main" val="0"/>
-              </a:ext>
-            </a:extLst>
-          </a:blip>
-          <a:stretch>
-            <a:fillRect/>
-          </a:stretch>
-        </p:blipFill>
-        <p:spPr>
-          <a:xfrm>
-            <a:off x="1320872" y="1413028"/>
-            <a:ext cx="3840480" cy="4572000"/>
-          </a:xfrm>
-          <a:prstGeom prst="rect">
-            <a:avLst/>
-          </a:prstGeom>
-        </p:spPr>
-      </p:pic>
       <p:cxnSp>
         <p:nvCxnSpPr>
           <p:cNvPr id="10" name="Straight Arrow Connector 9"/>
@@ -3097,9 +3040,9 @@
           <p:nvPr/>
         </p:nvCxnSpPr>
         <p:spPr>
-          <a:xfrm>
-            <a:off x="9410700" y="2543175"/>
-            <a:ext cx="0" cy="428625"/>
+          <a:xfrm flipH="1" flipV="1">
+            <a:off x="4424454" y="5419417"/>
+            <a:ext cx="0" cy="457200"/>
           </a:xfrm>
           <a:prstGeom prst="straightConnector1">
             <a:avLst/>
@@ -3134,7 +3077,7 @@
         </p:nvCxnSpPr>
         <p:spPr>
           <a:xfrm flipV="1">
-            <a:off x="7296150" y="2266950"/>
+            <a:off x="1840928" y="5419417"/>
             <a:ext cx="0" cy="485775"/>
           </a:xfrm>
           <a:prstGeom prst="straightConnector1">
@@ -3390,6 +3333,120 @@
                 </a:schemeClr>
               </a:solidFill>
               <a:latin typeface="+mj-lt"/>
+            </a:endParaRPr>
+          </a:p>
+        </p:txBody>
+      </p:sp>
+      <p:pic>
+        <p:nvPicPr>
+          <p:cNvPr id="12" name="Picture 11"/>
+          <p:cNvPicPr>
+            <a:picLocks noChangeAspect="1"/>
+          </p:cNvPicPr>
+          <p:nvPr/>
+        </p:nvPicPr>
+        <p:blipFill>
+          <a:blip r:embed="rId4">
+            <a:extLst>
+              <a:ext uri="{28A0092B-C50C-407E-A947-70E740481C1C}">
+                <a14:useLocalDpi xmlns:a14="http://schemas.microsoft.com/office/drawing/2010/main" val="0"/>
+              </a:ext>
+            </a:extLst>
+          </a:blip>
+          <a:stretch>
+            <a:fillRect/>
+          </a:stretch>
+        </p:blipFill>
+        <p:spPr>
+          <a:xfrm>
+            <a:off x="6842745" y="911203"/>
+            <a:ext cx="4608576" cy="5486400"/>
+          </a:xfrm>
+          <a:prstGeom prst="rect">
+            <a:avLst/>
+          </a:prstGeom>
+        </p:spPr>
+      </p:pic>
+      <p:sp>
+        <p:nvSpPr>
+          <p:cNvPr id="15" name="TextBox 14"/>
+          <p:cNvSpPr txBox="1"/>
+          <p:nvPr/>
+        </p:nvSpPr>
+        <p:spPr>
+          <a:xfrm>
+            <a:off x="2882990" y="1307025"/>
+            <a:ext cx="2984410" cy="461665"/>
+          </a:xfrm>
+          <a:prstGeom prst="rect">
+            <a:avLst/>
+          </a:prstGeom>
+          <a:solidFill>
+            <a:srgbClr val="FFFFFF">
+              <a:alpha val="50196"/>
+            </a:srgbClr>
+          </a:solidFill>
+        </p:spPr>
+        <p:txBody>
+          <a:bodyPr wrap="square" rtlCol="0">
+            <a:spAutoFit/>
+          </a:bodyPr>
+          <a:lstStyle/>
+          <a:p>
+            <a:r>
+              <a:rPr lang="en-US" sz="1200" dirty="0" smtClean="0">
+                <a:latin typeface="DejaVu Sans" panose="020B0603030804020204" pitchFamily="34" charset="0"/>
+                <a:ea typeface="DejaVu Sans" panose="020B0603030804020204" pitchFamily="34" charset="0"/>
+                <a:cs typeface="DejaVu Sans" panose="020B0603030804020204" pitchFamily="34" charset="0"/>
+              </a:rPr>
+              <a:t>LEO mission</a:t>
+            </a:r>
+          </a:p>
+          <a:p>
+            <a:r>
+              <a:rPr lang="en-US" sz="1200" dirty="0" smtClean="0">
+                <a:latin typeface="DejaVu Sans" panose="020B0603030804020204" pitchFamily="34" charset="0"/>
+                <a:ea typeface="DejaVu Sans" panose="020B0603030804020204" pitchFamily="34" charset="0"/>
+                <a:cs typeface="DejaVu Sans" panose="020B0603030804020204" pitchFamily="34" charset="0"/>
+              </a:rPr>
+              <a:t>stage 1&amp;2: </a:t>
+            </a:r>
+            <a:r>
+              <a:rPr lang="en-US" sz="1200" dirty="0">
+                <a:latin typeface="DejaVu Sans" panose="020B0603030804020204" pitchFamily="34" charset="0"/>
+                <a:ea typeface="DejaVu Sans" panose="020B0603030804020204" pitchFamily="34" charset="0"/>
+                <a:cs typeface="DejaVu Sans" panose="020B0603030804020204" pitchFamily="34" charset="0"/>
+              </a:rPr>
+              <a:t>kerosene gas </a:t>
+            </a:r>
+            <a:r>
+              <a:rPr lang="en-US" sz="1200" dirty="0" smtClean="0">
+                <a:latin typeface="DejaVu Sans" panose="020B0603030804020204" pitchFamily="34" charset="0"/>
+                <a:ea typeface="DejaVu Sans" panose="020B0603030804020204" pitchFamily="34" charset="0"/>
+                <a:cs typeface="DejaVu Sans" panose="020B0603030804020204" pitchFamily="34" charset="0"/>
+              </a:rPr>
+              <a:t>gen. </a:t>
+            </a:r>
+            <a:r>
+              <a:rPr lang="en-US" sz="1200" dirty="0">
+                <a:latin typeface="DejaVu Sans" panose="020B0603030804020204" pitchFamily="34" charset="0"/>
+                <a:ea typeface="DejaVu Sans" panose="020B0603030804020204" pitchFamily="34" charset="0"/>
+                <a:cs typeface="DejaVu Sans" panose="020B0603030804020204" pitchFamily="34" charset="0"/>
+              </a:rPr>
+              <a:t>tech</a:t>
+            </a:r>
+            <a:r>
+              <a:rPr lang="en-US" sz="1200" dirty="0" smtClean="0">
+                <a:latin typeface="DejaVu Sans" panose="020B0603030804020204" pitchFamily="34" charset="0"/>
+                <a:ea typeface="DejaVu Sans" panose="020B0603030804020204" pitchFamily="34" charset="0"/>
+                <a:cs typeface="DejaVu Sans" panose="020B0603030804020204" pitchFamily="34" charset="0"/>
+              </a:rPr>
+              <a:t>.</a:t>
+            </a:r>
+            <a:endParaRPr lang="en-US" sz="1200" dirty="0">
+              <a:latin typeface="DejaVu Sans" panose="020B0603030804020204" pitchFamily="34" charset="0"/>
+              <a:ea typeface="DejaVu Sans" panose="020B0603030804020204" pitchFamily="34" charset="0"/>
+              <a:cs typeface="DejaVu Sans" panose="020B0603030804020204" pitchFamily="34" charset="0"/>
             </a:endParaRPr>
           </a:p>
         </p:txBody>
@@ -3465,7 +3522,7 @@
                                           </p:stCondLst>
                                         </p:cTn>
                                         <p:tgtEl>
-                                          <p:spTgt spid="8"/>
+                                          <p:spTgt spid="12"/>
                                         </p:tgtEl>
                                         <p:attrNameLst>
                                           <p:attrName>style.visibility</p:attrName>
@@ -3537,7 +3594,7 @@
                                           </p:stCondLst>
                                         </p:cTn>
                                         <p:tgtEl>
-                                          <p:spTgt spid="8"/>
+                                          <p:spTgt spid="12"/>
                                         </p:tgtEl>
                                         <p:attrNameLst>
                                           <p:attrName>style.visibility</p:attrName>
@@ -3582,7 +3639,7 @@
                                           </p:stCondLst>
                                         </p:cTn>
                                         <p:tgtEl>
-                                          <p:spTgt spid="7"/>
+                                          <p:spTgt spid="11"/>
                                         </p:tgtEl>
                                         <p:attrNameLst>
                                           <p:attrName>style.visibility</p:attrName>
@@ -3609,7 +3666,7 @@
                                           </p:stCondLst>
                                         </p:cTn>
                                         <p:tgtEl>
-                                          <p:spTgt spid="11"/>
+                                          <p:spTgt spid="14"/>
                                         </p:tgtEl>
                                         <p:attrNameLst>
                                           <p:attrName>style.visibility</p:attrName>
@@ -3670,56 +3727,9 @@
           <a:chExt cx="0" cy="0"/>
         </a:xfrm>
       </p:grpSpPr>
-      <p:sp>
-        <p:nvSpPr>
-          <p:cNvPr id="2" name="Title 1"/>
-          <p:cNvSpPr>
-            <a:spLocks noGrp="1"/>
-          </p:cNvSpPr>
-          <p:nvPr>
-            <p:ph type="title"/>
-          </p:nvPr>
-        </p:nvSpPr>
-        <p:spPr/>
-        <p:txBody>
-          <a:bodyPr/>
-          <a:lstStyle/>
-          <a:p>
-            <a:r>
-              <a:rPr lang="en-US" dirty="0" smtClean="0"/>
-              <a:t>High launch rates enable reuse development to be paid off</a:t>
-            </a:r>
-            <a:endParaRPr lang="en-US" dirty="0"/>
-          </a:p>
-        </p:txBody>
-      </p:sp>
-      <p:sp>
-        <p:nvSpPr>
-          <p:cNvPr id="4" name="Slide Number Placeholder 3"/>
-          <p:cNvSpPr>
-            <a:spLocks noGrp="1"/>
-          </p:cNvSpPr>
-          <p:nvPr>
-            <p:ph type="sldNum" sz="quarter" idx="12"/>
-          </p:nvPr>
-        </p:nvSpPr>
-        <p:spPr/>
-        <p:txBody>
-          <a:bodyPr/>
-          <a:lstStyle/>
-          <a:p>
-            <a:fld id="{AE222D66-B5FE-46B9-85ED-7C46672533E9}" type="slidenum">
-              <a:rPr lang="en-US" smtClean="0"/>
-              <a:pPr/>
-              <a:t>13</a:t>
-            </a:fld>
-            <a:endParaRPr lang="en-US"/>
-          </a:p>
-        </p:txBody>
-      </p:sp>
       <p:pic>
         <p:nvPicPr>
-          <p:cNvPr id="5" name="Picture 4"/>
+          <p:cNvPr id="25" name="Picture 24"/>
           <p:cNvPicPr>
             <a:picLocks noChangeAspect="1"/>
           </p:cNvPicPr>
@@ -3739,8 +3749,8 @@
         </p:blipFill>
         <p:spPr>
           <a:xfrm>
-            <a:off x="3065138" y="996309"/>
-            <a:ext cx="7183762" cy="5387821"/>
+            <a:off x="2452252" y="890731"/>
+            <a:ext cx="7287497" cy="5465623"/>
           </a:xfrm>
           <a:prstGeom prst="rect">
             <a:avLst/>
@@ -3749,43 +3759,22 @@
       </p:pic>
       <p:sp>
         <p:nvSpPr>
-          <p:cNvPr id="6" name="Rectangle 5"/>
-          <p:cNvSpPr/>
-          <p:nvPr/>
+          <p:cNvPr id="2" name="Title 1"/>
+          <p:cNvSpPr>
+            <a:spLocks noGrp="1"/>
+          </p:cNvSpPr>
+          <p:nvPr>
+            <p:ph type="title"/>
+          </p:nvPr>
         </p:nvSpPr>
-        <p:spPr>
-          <a:xfrm>
-            <a:off x="5886449" y="1600200"/>
-            <a:ext cx="1247775" cy="4092632"/>
-          </a:xfrm>
-          <a:prstGeom prst="rect">
-            <a:avLst/>
-          </a:prstGeom>
-        </p:spPr>
-        <p:style>
-          <a:lnRef idx="2">
-            <a:schemeClr val="accent1">
-              <a:shade val="50000"/>
-            </a:schemeClr>
-          </a:lnRef>
-          <a:fillRef idx="1">
-            <a:schemeClr val="accent1"/>
-          </a:fillRef>
-          <a:effectRef idx="0">
-            <a:schemeClr val="accent1"/>
-          </a:effectRef>
-          <a:fontRef idx="minor">
-            <a:schemeClr val="lt1"/>
-          </a:fontRef>
-        </p:style>
+        <p:spPr/>
         <p:txBody>
-          <a:bodyPr rtlCol="0" anchor="ctr"/>
+          <a:bodyPr/>
           <a:lstStyle/>
           <a:p>
-            <a:pPr algn="ctr"/>
             <a:r>
               <a:rPr lang="en-US" dirty="0" smtClean="0"/>
-              <a:t>Medium-large</a:t>
+              <a:t>High launch rates enable reuse development to be paid off</a:t>
             </a:r>
             <a:endParaRPr lang="en-US" dirty="0"/>
           </a:p>
@@ -3793,45 +3782,25 @@
       </p:sp>
       <p:sp>
         <p:nvSpPr>
-          <p:cNvPr id="7" name="Rectangle 6"/>
-          <p:cNvSpPr/>
-          <p:nvPr/>
+          <p:cNvPr id="4" name="Slide Number Placeholder 3"/>
+          <p:cNvSpPr>
+            <a:spLocks noGrp="1"/>
+          </p:cNvSpPr>
+          <p:nvPr>
+            <p:ph type="sldNum" sz="quarter" idx="12"/>
+          </p:nvPr>
         </p:nvSpPr>
-        <p:spPr>
-          <a:xfrm>
-            <a:off x="8715374" y="1600200"/>
-            <a:ext cx="1152525" cy="4092632"/>
-          </a:xfrm>
-          <a:prstGeom prst="rect">
-            <a:avLst/>
-          </a:prstGeom>
-        </p:spPr>
-        <p:style>
-          <a:lnRef idx="2">
-            <a:schemeClr val="accent1">
-              <a:shade val="50000"/>
-            </a:schemeClr>
-          </a:lnRef>
-          <a:fillRef idx="1">
-            <a:schemeClr val="accent1"/>
-          </a:fillRef>
-          <a:effectRef idx="0">
-            <a:schemeClr val="accent1"/>
-          </a:effectRef>
-          <a:fontRef idx="minor">
-            <a:schemeClr val="lt1"/>
-          </a:fontRef>
-        </p:style>
+        <p:spPr/>
         <p:txBody>
-          <a:bodyPr rtlCol="0" anchor="ctr"/>
+          <a:bodyPr/>
           <a:lstStyle/>
           <a:p>
-            <a:pPr algn="ctr"/>
-            <a:r>
-              <a:rPr lang="en-US" dirty="0" smtClean="0"/>
-              <a:t>small</a:t>
-            </a:r>
-            <a:endParaRPr lang="en-US" dirty="0"/>
+            <a:fld id="{AE222D66-B5FE-46B9-85ED-7C46672533E9}" type="slidenum">
+              <a:rPr lang="en-US" smtClean="0"/>
+              <a:pPr/>
+              <a:t>13</a:t>
+            </a:fld>
+            <a:endParaRPr lang="en-US"/>
           </a:p>
         </p:txBody>
       </p:sp>
@@ -4063,44 +4032,6 @@
                 </a:schemeClr>
               </a:solidFill>
               <a:latin typeface="+mj-lt"/>
-            </a:endParaRPr>
-          </a:p>
-        </p:txBody>
-      </p:sp>
-      <p:sp>
-        <p:nvSpPr>
-          <p:cNvPr id="9" name="TextBox 8"/>
-          <p:cNvSpPr txBox="1"/>
-          <p:nvPr/>
-        </p:nvSpPr>
-        <p:spPr>
-          <a:xfrm>
-            <a:off x="4881684" y="1986427"/>
-            <a:ext cx="737574" cy="369332"/>
-          </a:xfrm>
-          <a:prstGeom prst="rect">
-            <a:avLst/>
-          </a:prstGeom>
-          <a:noFill/>
-        </p:spPr>
-        <p:txBody>
-          <a:bodyPr wrap="none" rtlCol="0">
-            <a:spAutoFit/>
-          </a:bodyPr>
-          <a:lstStyle/>
-          <a:p>
-            <a:r>
-              <a:rPr lang="en-US" dirty="0" smtClean="0">
-                <a:solidFill>
-                  <a:srgbClr val="FF0000"/>
-                </a:solidFill>
-              </a:rPr>
-              <a:t>TODO</a:t>
-            </a:r>
-            <a:endParaRPr lang="en-US" dirty="0">
-              <a:solidFill>
-                <a:srgbClr val="FF0000"/>
-              </a:solidFill>
             </a:endParaRPr>
           </a:p>
         </p:txBody>
@@ -8425,11 +8356,7 @@
           <a:p>
             <a:r>
               <a:rPr lang="en-US" sz="1600" dirty="0" smtClean="0"/>
-              <a:t>Recovery </a:t>
-            </a:r>
-            <a:r>
-              <a:rPr lang="en-US" sz="1600" dirty="0" smtClean="0"/>
-              <a:t>hardware</a:t>
+              <a:t>Recovery hardware</a:t>
             </a:r>
             <a:endParaRPr lang="en-US" sz="1600" dirty="0"/>
           </a:p>
@@ -8826,11 +8753,7 @@
           <a:p>
             <a:r>
               <a:rPr lang="en-US" sz="1600" dirty="0" smtClean="0"/>
-              <a:t>Recovery </a:t>
-            </a:r>
-            <a:r>
-              <a:rPr lang="en-US" sz="1600" dirty="0" smtClean="0"/>
-              <a:t>propellant</a:t>
+              <a:t>Recovery propellant</a:t>
             </a:r>
             <a:endParaRPr lang="en-US" sz="1600" dirty="0"/>
           </a:p>

</xml_diff>

<commit_message>
unborked combined.tex, updated presentation CpF figure
</commit_message>
<xml_diff>
--- a/presentations/strategies_for_first_stage_reuse.pptx
+++ b/presentations/strategies_for_first_stage_reuse.pptx
@@ -210,7 +210,7 @@
           <a:p>
             <a:fld id="{87F85518-7193-43B3-BB30-DCB687ABA441}" type="datetimeFigureOut">
               <a:rPr lang="en-US" smtClean="0"/>
-              <a:t>9/23/2018</a:t>
+              <a:t>9/24/18</a:t>
             </a:fld>
             <a:endParaRPr lang="en-US"/>
           </a:p>
@@ -274,38 +274,37 @@
           <a:p>
             <a:pPr lvl="0"/>
             <a:r>
-              <a:rPr lang="en-US" smtClean="0"/>
+              <a:rPr lang="en-US"/>
               <a:t>Edit Master text styles</a:t>
             </a:r>
           </a:p>
           <a:p>
             <a:pPr lvl="1"/>
             <a:r>
-              <a:rPr lang="en-US" smtClean="0"/>
+              <a:rPr lang="en-US"/>
               <a:t>Second level</a:t>
             </a:r>
           </a:p>
           <a:p>
             <a:pPr lvl="2"/>
             <a:r>
-              <a:rPr lang="en-US" smtClean="0"/>
+              <a:rPr lang="en-US"/>
               <a:t>Third level</a:t>
             </a:r>
           </a:p>
           <a:p>
             <a:pPr lvl="3"/>
             <a:r>
-              <a:rPr lang="en-US" smtClean="0"/>
+              <a:rPr lang="en-US"/>
               <a:t>Fourth level</a:t>
             </a:r>
           </a:p>
           <a:p>
             <a:pPr lvl="4"/>
             <a:r>
-              <a:rPr lang="en-US" smtClean="0"/>
+              <a:rPr lang="en-US"/>
               <a:t>Fifth level</a:t>
             </a:r>
-            <a:endParaRPr lang="en-US"/>
           </a:p>
         </p:txBody>
       </p:sp>
@@ -520,7 +519,7 @@
           </a:lstStyle>
           <a:p>
             <a:r>
-              <a:rPr lang="en-US" smtClean="0"/>
+              <a:rPr lang="en-US"/>
               <a:t>Click to edit Master title style</a:t>
             </a:r>
             <a:endParaRPr lang="en-US" dirty="0"/>
@@ -595,16 +594,15 @@
           </a:lstStyle>
           <a:p>
             <a:r>
-              <a:rPr lang="en-US" dirty="0" smtClean="0"/>
+              <a:rPr lang="en-US" dirty="0"/>
               <a:t>[Speaker]</a:t>
             </a:r>
           </a:p>
           <a:p>
             <a:r>
-              <a:rPr lang="en-US" dirty="0" smtClean="0"/>
+              <a:rPr lang="en-US" dirty="0"/>
               <a:t>[Date]</a:t>
             </a:r>
-            <a:endParaRPr lang="en-US" dirty="0"/>
           </a:p>
         </p:txBody>
       </p:sp>
@@ -689,13 +687,6 @@
   <p:clrMapOvr>
     <a:masterClrMapping/>
   </p:clrMapOvr>
-  <p:timing>
-    <p:tnLst>
-      <p:par>
-        <p:cTn id="1" dur="indefinite" restart="never" nodeType="tmRoot"/>
-      </p:par>
-    </p:tnLst>
-  </p:timing>
 </p:sldLayout>
 </file>
 
@@ -747,10 +738,9 @@
           </a:lstStyle>
           <a:p>
             <a:r>
-              <a:rPr lang="en-US" dirty="0" smtClean="0"/>
+              <a:rPr lang="en-US" dirty="0"/>
               <a:t>Click to edit Master title style</a:t>
             </a:r>
-            <a:endParaRPr lang="en-US" dirty="0"/>
           </a:p>
         </p:txBody>
       </p:sp>
@@ -819,38 +809,37 @@
           <a:p>
             <a:pPr lvl="0"/>
             <a:r>
-              <a:rPr lang="en-US" dirty="0" smtClean="0"/>
+              <a:rPr lang="en-US" dirty="0"/>
               <a:t>Edit Master text styles</a:t>
             </a:r>
           </a:p>
           <a:p>
             <a:pPr lvl="1"/>
             <a:r>
-              <a:rPr lang="en-US" dirty="0" smtClean="0"/>
+              <a:rPr lang="en-US" dirty="0"/>
               <a:t>Second level</a:t>
             </a:r>
           </a:p>
           <a:p>
             <a:pPr lvl="2"/>
             <a:r>
-              <a:rPr lang="en-US" dirty="0" smtClean="0"/>
+              <a:rPr lang="en-US" dirty="0"/>
               <a:t>Third level</a:t>
             </a:r>
           </a:p>
           <a:p>
             <a:pPr lvl="3"/>
             <a:r>
-              <a:rPr lang="en-US" dirty="0" smtClean="0"/>
+              <a:rPr lang="en-US" dirty="0"/>
               <a:t>Fourth level</a:t>
             </a:r>
           </a:p>
           <a:p>
             <a:pPr lvl="4"/>
             <a:r>
-              <a:rPr lang="en-US" dirty="0" smtClean="0"/>
+              <a:rPr lang="en-US" dirty="0"/>
               <a:t>Fifth level</a:t>
             </a:r>
-            <a:endParaRPr lang="en-US" dirty="0"/>
           </a:p>
         </p:txBody>
       </p:sp>
@@ -900,13 +889,6 @@
   <p:clrMapOvr>
     <a:masterClrMapping/>
   </p:clrMapOvr>
-  <p:timing>
-    <p:tnLst>
-      <p:par>
-        <p:cTn id="1" dur="indefinite" restart="never" nodeType="tmRoot"/>
-      </p:par>
-    </p:tnLst>
-  </p:timing>
 </p:sldLayout>
 </file>
 
@@ -1025,7 +1007,7 @@
           <a:p>
             <a:pPr lvl="0"/>
             <a:r>
-              <a:rPr lang="en-US" smtClean="0"/>
+              <a:rPr lang="en-US"/>
               <a:t>Edit Master text styles</a:t>
             </a:r>
           </a:p>
@@ -1041,13 +1023,6 @@
   <p:clrMapOvr>
     <a:masterClrMapping/>
   </p:clrMapOvr>
-  <p:timing>
-    <p:tnLst>
-      <p:par>
-        <p:cTn id="1" dur="indefinite" restart="never" nodeType="tmRoot"/>
-      </p:par>
-    </p:tnLst>
-  </p:timing>
 </p:sldLayout>
 </file>
 
@@ -1186,14 +1161,14 @@
           <a:p>
             <a:pPr lvl="0"/>
             <a:r>
-              <a:rPr lang="en-US" dirty="0" smtClean="0"/>
+              <a:rPr lang="en-US" dirty="0"/>
               <a:t>Previous Sections</a:t>
             </a:r>
           </a:p>
           <a:p>
             <a:pPr lvl="0"/>
             <a:r>
-              <a:rPr lang="en-US" dirty="0" smtClean="0"/>
+              <a:rPr lang="en-US" dirty="0"/>
               <a:t>Current Section</a:t>
             </a:r>
           </a:p>
@@ -1222,7 +1197,7 @@
           <a:lstStyle/>
           <a:p>
             <a:r>
-              <a:rPr lang="en-US" sz="1800" dirty="0" smtClean="0">
+              <a:rPr lang="en-US" sz="1800" dirty="0">
                 <a:solidFill>
                   <a:schemeClr val="accent5"/>
                 </a:solidFill>
@@ -1230,12 +1205,6 @@
               </a:rPr>
               <a:t>Outline</a:t>
             </a:r>
-            <a:endParaRPr lang="en-US" sz="1800" dirty="0">
-              <a:solidFill>
-                <a:schemeClr val="accent5"/>
-              </a:solidFill>
-              <a:latin typeface="+mj-lt"/>
-            </a:endParaRPr>
           </a:p>
         </p:txBody>
       </p:sp>
@@ -1249,13 +1218,6 @@
   <p:clrMapOvr>
     <a:masterClrMapping/>
   </p:clrMapOvr>
-  <p:timing>
-    <p:tnLst>
-      <p:par>
-        <p:cTn id="1" dur="indefinite" restart="never" nodeType="tmRoot"/>
-      </p:par>
-    </p:tnLst>
-  </p:timing>
 </p:sldLayout>
 </file>
 
@@ -1307,10 +1269,9 @@
           <a:lstStyle/>
           <a:p>
             <a:r>
-              <a:rPr lang="en-US" smtClean="0"/>
+              <a:rPr lang="en-US"/>
               <a:t>Click to edit Master title style</a:t>
             </a:r>
-            <a:endParaRPr lang="en-US"/>
           </a:p>
         </p:txBody>
       </p:sp>
@@ -1341,38 +1302,37 @@
           <a:p>
             <a:pPr lvl="0"/>
             <a:r>
-              <a:rPr lang="en-US" smtClean="0"/>
+              <a:rPr lang="en-US"/>
               <a:t>Edit Master text styles</a:t>
             </a:r>
           </a:p>
           <a:p>
             <a:pPr lvl="1"/>
             <a:r>
-              <a:rPr lang="en-US" smtClean="0"/>
+              <a:rPr lang="en-US"/>
               <a:t>Second level</a:t>
             </a:r>
           </a:p>
           <a:p>
             <a:pPr lvl="2"/>
             <a:r>
-              <a:rPr lang="en-US" smtClean="0"/>
+              <a:rPr lang="en-US"/>
               <a:t>Third level</a:t>
             </a:r>
           </a:p>
           <a:p>
             <a:pPr lvl="3"/>
             <a:r>
-              <a:rPr lang="en-US" smtClean="0"/>
+              <a:rPr lang="en-US"/>
               <a:t>Fourth level</a:t>
             </a:r>
           </a:p>
           <a:p>
             <a:pPr lvl="4"/>
             <a:r>
-              <a:rPr lang="en-US" smtClean="0"/>
+              <a:rPr lang="en-US"/>
               <a:t>Fifth level</a:t>
             </a:r>
-            <a:endParaRPr lang="en-US"/>
           </a:p>
         </p:txBody>
       </p:sp>
@@ -1431,13 +1391,6 @@
     <p:sldLayoutId id="2147483663" r:id="rId3"/>
     <p:sldLayoutId id="2147483664" r:id="rId4"/>
   </p:sldLayoutIdLst>
-  <p:timing>
-    <p:tnLst>
-      <p:par>
-        <p:cTn id="1" dur="indefinite" restart="never" nodeType="tmRoot"/>
-      </p:par>
-    </p:tnLst>
-  </p:timing>
   <p:hf hdr="0" ftr="0" dt="0"/>
   <p:txStyles>
     <p:titleStyle>
@@ -1757,17 +1710,16 @@
           <a:lstStyle/>
           <a:p>
             <a:r>
-              <a:rPr lang="en-US" sz="3600" dirty="0" smtClean="0"/>
+              <a:rPr lang="en-US" sz="3600" dirty="0"/>
               <a:t>Strategies for Reuse of</a:t>
             </a:r>
             <a:br>
-              <a:rPr lang="en-US" sz="3600" dirty="0" smtClean="0"/>
+              <a:rPr lang="en-US" sz="3600" dirty="0"/>
             </a:br>
             <a:r>
-              <a:rPr lang="en-US" sz="3600" dirty="0" smtClean="0"/>
+              <a:rPr lang="en-US" sz="3600" dirty="0"/>
               <a:t>Launch Vehicle First Stages</a:t>
             </a:r>
-            <a:endParaRPr lang="en-US" sz="3600" dirty="0"/>
           </a:p>
         </p:txBody>
       </p:sp>
@@ -1789,25 +1741,25 @@
           <a:lstStyle/>
           <a:p>
             <a:r>
-              <a:rPr lang="en-US" sz="2200" dirty="0" smtClean="0"/>
+              <a:rPr lang="en-US" sz="2200" dirty="0"/>
               <a:t>Matthew </a:t>
             </a:r>
             <a:r>
-              <a:rPr lang="en-US" sz="2200" dirty="0" err="1" smtClean="0"/>
+              <a:rPr lang="en-US" sz="2200" dirty="0" err="1"/>
               <a:t>Vernacchia</a:t>
             </a:r>
-            <a:endParaRPr lang="en-US" sz="2200" dirty="0" smtClean="0"/>
-          </a:p>
-          <a:p>
-            <a:r>
-              <a:rPr lang="en-US" sz="2200" dirty="0" smtClean="0"/>
+            <a:endParaRPr lang="en-US" sz="2200" dirty="0"/>
+          </a:p>
+          <a:p>
+            <a:r>
+              <a:rPr lang="en-US" sz="2200" dirty="0"/>
               <a:t>Kelly </a:t>
             </a:r>
             <a:r>
-              <a:rPr lang="en-US" sz="2200" dirty="0" err="1" smtClean="0"/>
+              <a:rPr lang="en-US" sz="2200" dirty="0" err="1"/>
               <a:t>Mathesius</a:t>
             </a:r>
-            <a:endParaRPr lang="en-US" sz="2200" dirty="0" smtClean="0"/>
+            <a:endParaRPr lang="en-US" sz="2200" dirty="0"/>
           </a:p>
           <a:p>
             <a:endParaRPr lang="en-US" sz="2200" dirty="0"/>
@@ -1843,16 +1795,15 @@
           <a:lstStyle/>
           <a:p>
             <a:r>
-              <a:rPr lang="en-US" dirty="0" smtClean="0"/>
+              <a:rPr lang="en-US" dirty="0"/>
               <a:t>Are any first stage reuse strategies economically worthwhile?</a:t>
             </a:r>
           </a:p>
           <a:p>
             <a:r>
-              <a:rPr lang="en-US" dirty="0" smtClean="0"/>
+              <a:rPr lang="en-US" dirty="0"/>
               <a:t>… under what mission, market, and technological conditions? </a:t>
             </a:r>
-            <a:endParaRPr lang="en-US" dirty="0"/>
           </a:p>
         </p:txBody>
       </p:sp>
@@ -1866,13 +1817,6 @@
   <p:clrMapOvr>
     <a:masterClrMapping/>
   </p:clrMapOvr>
-  <p:timing>
-    <p:tnLst>
-      <p:par>
-        <p:cTn id="1" dur="indefinite" restart="never" nodeType="tmRoot"/>
-      </p:par>
-    </p:tnLst>
-  </p:timing>
 </p:sld>
 </file>
 
@@ -1893,6 +1837,36 @@
           <a:chExt cx="0" cy="0"/>
         </a:xfrm>
       </p:grpSpPr>
+      <p:pic>
+        <p:nvPicPr>
+          <p:cNvPr id="3" name="Picture 2">
+            <a:extLst>
+              <a:ext uri="{FF2B5EF4-FFF2-40B4-BE49-F238E27FC236}">
+                <a16:creationId xmlns:a16="http://schemas.microsoft.com/office/drawing/2014/main" id="{5D5FB73C-E360-C845-9376-3AD97206F4D4}"/>
+              </a:ext>
+            </a:extLst>
+          </p:cNvPr>
+          <p:cNvPicPr>
+            <a:picLocks noChangeAspect="1"/>
+          </p:cNvPicPr>
+          <p:nvPr/>
+        </p:nvPicPr>
+        <p:blipFill>
+          <a:blip r:embed="rId2"/>
+          <a:stretch>
+            <a:fillRect/>
+          </a:stretch>
+        </p:blipFill>
+        <p:spPr>
+          <a:xfrm>
+            <a:off x="1679539" y="986590"/>
+            <a:ext cx="8832923" cy="5299754"/>
+          </a:xfrm>
+          <a:prstGeom prst="rect">
+            <a:avLst/>
+          </a:prstGeom>
+        </p:spPr>
+      </p:pic>
       <p:sp>
         <p:nvSpPr>
           <p:cNvPr id="2" name="Title 1"/>
@@ -1909,10 +1883,9 @@
           <a:lstStyle/>
           <a:p>
             <a:r>
-              <a:rPr lang="en-US" dirty="0" smtClean="0"/>
+              <a:rPr lang="en-US" dirty="0"/>
               <a:t>Downrange propulsive landing has lowest estimated cost</a:t>
             </a:r>
-            <a:endParaRPr lang="en-US" dirty="0"/>
           </a:p>
         </p:txBody>
       </p:sp>
@@ -2131,7 +2104,7 @@
               <a:buNone/>
             </a:pPr>
             <a:r>
-              <a:rPr lang="en-US" dirty="0" smtClean="0">
+              <a:rPr lang="en-US" dirty="0">
                 <a:solidFill>
                   <a:schemeClr val="tx1">
                     <a:lumMod val="50000"/>
@@ -2143,13 +2116,13 @@
               <a:t>Intro | 1. Production costs | </a:t>
             </a:r>
             <a:r>
-              <a:rPr lang="en-US" b="1" dirty="0" smtClean="0">
+              <a:rPr lang="en-US" b="1" dirty="0">
                 <a:latin typeface="+mj-lt"/>
               </a:rPr>
               <a:t>2. Lowest-cost strategy </a:t>
             </a:r>
             <a:r>
-              <a:rPr lang="en-US" dirty="0" smtClean="0">
+              <a:rPr lang="en-US" dirty="0">
                 <a:solidFill>
                   <a:schemeClr val="tx1">
                     <a:lumMod val="50000"/>
@@ -2159,125 +2132,6 @@
                 <a:latin typeface="+mj-lt"/>
               </a:rPr>
               <a:t>| 3. Conditions for reuse viability | Conclusion</a:t>
-            </a:r>
-            <a:endParaRPr lang="en-US" dirty="0">
-              <a:solidFill>
-                <a:schemeClr val="tx1">
-                  <a:lumMod val="50000"/>
-                  <a:lumOff val="50000"/>
-                </a:schemeClr>
-              </a:solidFill>
-              <a:latin typeface="+mj-lt"/>
-            </a:endParaRPr>
-          </a:p>
-        </p:txBody>
-      </p:sp>
-      <p:pic>
-        <p:nvPicPr>
-          <p:cNvPr id="6" name="Picture 5"/>
-          <p:cNvPicPr>
-            <a:picLocks noChangeAspect="1"/>
-          </p:cNvPicPr>
-          <p:nvPr/>
-        </p:nvPicPr>
-        <p:blipFill>
-          <a:blip r:embed="rId2">
-            <a:extLst>
-              <a:ext uri="{28A0092B-C50C-407E-A947-70E740481C1C}">
-                <a14:useLocalDpi xmlns:a14="http://schemas.microsoft.com/office/drawing/2010/main" val="0"/>
-              </a:ext>
-            </a:extLst>
-          </a:blip>
-          <a:stretch>
-            <a:fillRect/>
-          </a:stretch>
-        </p:blipFill>
-        <p:spPr>
-          <a:xfrm>
-            <a:off x="1739303" y="1124796"/>
-            <a:ext cx="8713394" cy="5228036"/>
-          </a:xfrm>
-          <a:prstGeom prst="rect">
-            <a:avLst/>
-          </a:prstGeom>
-        </p:spPr>
-      </p:pic>
-      <p:sp>
-        <p:nvSpPr>
-          <p:cNvPr id="7" name="Cross 6"/>
-          <p:cNvSpPr/>
-          <p:nvPr/>
-        </p:nvSpPr>
-        <p:spPr>
-          <a:xfrm rot="2713643">
-            <a:off x="7912381" y="4059037"/>
-            <a:ext cx="981731" cy="994616"/>
-          </a:xfrm>
-          <a:prstGeom prst="plus">
-            <a:avLst>
-              <a:gd name="adj" fmla="val 43460"/>
-            </a:avLst>
-          </a:prstGeom>
-          <a:solidFill>
-            <a:srgbClr val="FF0000">
-              <a:alpha val="30196"/>
-            </a:srgbClr>
-          </a:solidFill>
-          <a:ln>
-            <a:noFill/>
-          </a:ln>
-        </p:spPr>
-        <p:style>
-          <a:lnRef idx="2">
-            <a:schemeClr val="accent1">
-              <a:shade val="50000"/>
-            </a:schemeClr>
-          </a:lnRef>
-          <a:fillRef idx="1">
-            <a:schemeClr val="accent1"/>
-          </a:fillRef>
-          <a:effectRef idx="0">
-            <a:schemeClr val="accent1"/>
-          </a:effectRef>
-          <a:fontRef idx="minor">
-            <a:schemeClr val="lt1"/>
-          </a:fontRef>
-        </p:style>
-        <p:txBody>
-          <a:bodyPr rtlCol="0" anchor="ctr"/>
-          <a:lstStyle/>
-          <a:p>
-            <a:pPr algn="ctr"/>
-            <a:endParaRPr lang="en-US"/>
-          </a:p>
-        </p:txBody>
-      </p:sp>
-      <p:sp>
-        <p:nvSpPr>
-          <p:cNvPr id="8" name="TextBox 7"/>
-          <p:cNvSpPr txBox="1"/>
-          <p:nvPr/>
-        </p:nvSpPr>
-        <p:spPr>
-          <a:xfrm>
-            <a:off x="7936490" y="3436068"/>
-            <a:ext cx="933512" cy="461665"/>
-          </a:xfrm>
-          <a:prstGeom prst="rect">
-            <a:avLst/>
-          </a:prstGeom>
-          <a:noFill/>
-        </p:spPr>
-        <p:txBody>
-          <a:bodyPr wrap="square" rtlCol="0">
-            <a:spAutoFit/>
-          </a:bodyPr>
-          <a:lstStyle/>
-          <a:p>
-            <a:pPr algn="ctr"/>
-            <a:r>
-              <a:rPr lang="en-US" sz="1200" dirty="0" smtClean="0"/>
-              <a:t>Issues for large stages</a:t>
             </a:r>
           </a:p>
         </p:txBody>
@@ -2306,48 +2160,9 @@
           <a:p>
             <a:pPr algn="ctr"/>
             <a:r>
-              <a:rPr lang="en-US" sz="1200" dirty="0" smtClean="0"/>
+              <a:rPr lang="en-US" sz="1200" dirty="0"/>
               <a:t>Lowest estimated cost</a:t>
             </a:r>
-            <a:endParaRPr lang="en-US" sz="1200" dirty="0"/>
-          </a:p>
-        </p:txBody>
-      </p:sp>
-      <p:sp>
-        <p:nvSpPr>
-          <p:cNvPr id="13" name="TextBox 12"/>
-          <p:cNvSpPr txBox="1"/>
-          <p:nvPr/>
-        </p:nvSpPr>
-        <p:spPr>
-          <a:xfrm>
-            <a:off x="8034459" y="3178207"/>
-            <a:ext cx="737574" cy="369332"/>
-          </a:xfrm>
-          <a:prstGeom prst="rect">
-            <a:avLst/>
-          </a:prstGeom>
-          <a:noFill/>
-        </p:spPr>
-        <p:txBody>
-          <a:bodyPr wrap="none" rtlCol="0">
-            <a:spAutoFit/>
-          </a:bodyPr>
-          <a:lstStyle/>
-          <a:p>
-            <a:r>
-              <a:rPr lang="en-US" dirty="0" smtClean="0">
-                <a:solidFill>
-                  <a:srgbClr val="FF0000"/>
-                </a:solidFill>
-              </a:rPr>
-              <a:t>TODO</a:t>
-            </a:r>
-            <a:endParaRPr lang="en-US" dirty="0">
-              <a:solidFill>
-                <a:srgbClr val="FF0000"/>
-              </a:solidFill>
-            </a:endParaRPr>
           </a:p>
         </p:txBody>
       </p:sp>
@@ -2361,84 +2176,6 @@
   <p:clrMapOvr>
     <a:masterClrMapping/>
   </p:clrMapOvr>
-  <p:timing>
-    <p:tnLst>
-      <p:par>
-        <p:cTn id="1" dur="indefinite" restart="never" nodeType="tmRoot">
-          <p:childTnLst>
-            <p:seq concurrent="1" nextAc="seek">
-              <p:cTn id="2" dur="indefinite" nodeType="mainSeq">
-                <p:childTnLst>
-                  <p:par>
-                    <p:cTn id="3" fill="hold">
-                      <p:stCondLst>
-                        <p:cond delay="indefinite"/>
-                      </p:stCondLst>
-                      <p:childTnLst>
-                        <p:par>
-                          <p:cTn id="4" fill="hold">
-                            <p:stCondLst>
-                              <p:cond delay="0"/>
-                            </p:stCondLst>
-                            <p:childTnLst>
-                              <p:par>
-                                <p:cTn id="5" presetID="1" presetClass="entr" presetSubtype="0" fill="hold" grpId="0" nodeType="clickEffect">
-                                  <p:stCondLst>
-                                    <p:cond delay="0"/>
-                                  </p:stCondLst>
-                                  <p:childTnLst>
-                                    <p:set>
-                                      <p:cBhvr>
-                                        <p:cTn id="6" dur="1" fill="hold">
-                                          <p:stCondLst>
-                                            <p:cond delay="0"/>
-                                          </p:stCondLst>
-                                        </p:cTn>
-                                        <p:tgtEl>
-                                          <p:spTgt spid="7"/>
-                                        </p:tgtEl>
-                                        <p:attrNameLst>
-                                          <p:attrName>style.visibility</p:attrName>
-                                        </p:attrNameLst>
-                                      </p:cBhvr>
-                                      <p:to>
-                                        <p:strVal val="visible"/>
-                                      </p:to>
-                                    </p:set>
-                                  </p:childTnLst>
-                                </p:cTn>
-                              </p:par>
-                            </p:childTnLst>
-                          </p:cTn>
-                        </p:par>
-                      </p:childTnLst>
-                    </p:cTn>
-                  </p:par>
-                </p:childTnLst>
-              </p:cTn>
-              <p:prevCondLst>
-                <p:cond evt="onPrev" delay="0">
-                  <p:tgtEl>
-                    <p:sldTgt/>
-                  </p:tgtEl>
-                </p:cond>
-              </p:prevCondLst>
-              <p:nextCondLst>
-                <p:cond evt="onNext" delay="0">
-                  <p:tgtEl>
-                    <p:sldTgt/>
-                  </p:tgtEl>
-                </p:cond>
-              </p:nextCondLst>
-            </p:seq>
-          </p:childTnLst>
-        </p:cTn>
-      </p:par>
-    </p:tnLst>
-    <p:bldLst>
-      <p:bldP spid="7" grpId="0" animBg="1"/>
-    </p:bldLst>
-  </p:timing>
 </p:sld>
 </file>
 
@@ -2475,10 +2212,9 @@
           <a:lstStyle/>
           <a:p>
             <a:r>
-              <a:rPr lang="en-US" dirty="0" smtClean="0"/>
+              <a:rPr lang="en-US" dirty="0"/>
               <a:t>Cost decreases with number of reuses … up to a point</a:t>
             </a:r>
-            <a:endParaRPr lang="en-US" dirty="0"/>
           </a:p>
         </p:txBody>
       </p:sp>
@@ -2726,7 +2462,7 @@
               <a:buNone/>
             </a:pPr>
             <a:r>
-              <a:rPr lang="en-US" dirty="0" smtClean="0">
+              <a:rPr lang="en-US" dirty="0">
                 <a:solidFill>
                   <a:schemeClr val="tx1">
                     <a:lumMod val="50000"/>
@@ -2738,13 +2474,13 @@
               <a:t>Intro | 1. Production costs | 2. Lowest-cost strategy |</a:t>
             </a:r>
             <a:r>
-              <a:rPr lang="en-US" b="1" dirty="0" smtClean="0">
+              <a:rPr lang="en-US" b="1" dirty="0">
                 <a:latin typeface="+mj-lt"/>
               </a:rPr>
               <a:t> 3. Conditions for reuse viability</a:t>
             </a:r>
             <a:r>
-              <a:rPr lang="en-US" dirty="0" smtClean="0">
+              <a:rPr lang="en-US" dirty="0">
                 <a:solidFill>
                   <a:schemeClr val="tx1">
                     <a:lumMod val="50000"/>
@@ -2755,15 +2491,6 @@
               </a:rPr>
               <a:t> | Conclusion</a:t>
             </a:r>
-            <a:endParaRPr lang="en-US" dirty="0">
-              <a:solidFill>
-                <a:schemeClr val="tx1">
-                  <a:lumMod val="50000"/>
-                  <a:lumOff val="50000"/>
-                </a:schemeClr>
-              </a:solidFill>
-              <a:latin typeface="+mj-lt"/>
-            </a:endParaRPr>
           </a:p>
         </p:txBody>
       </p:sp>
@@ -2790,18 +2517,14 @@
           <a:lstStyle/>
           <a:p>
             <a:r>
-              <a:rPr lang="en-US" dirty="0" smtClean="0"/>
+              <a:rPr lang="en-US" dirty="0"/>
               <a:t>Confidently cheaper than expendable:</a:t>
             </a:r>
           </a:p>
           <a:p>
             <a:r>
               <a:rPr lang="en-US" dirty="0"/>
-              <a:t>	</a:t>
-            </a:r>
-            <a:r>
-              <a:rPr lang="en-US" dirty="0" smtClean="0"/>
-              <a:t>&gt; ~3 uses</a:t>
+              <a:t>	&gt; ~3 uses</a:t>
             </a:r>
           </a:p>
           <a:p>
@@ -2809,18 +2532,14 @@
           </a:p>
           <a:p>
             <a:r>
-              <a:rPr lang="en-US" dirty="0" smtClean="0"/>
+              <a:rPr lang="en-US" dirty="0"/>
               <a:t>Realize most of cost savings:</a:t>
             </a:r>
           </a:p>
           <a:p>
             <a:r>
               <a:rPr lang="en-US" dirty="0"/>
-              <a:t>	</a:t>
-            </a:r>
-            <a:r>
-              <a:rPr lang="en-US" dirty="0" smtClean="0"/>
-              <a:t>&gt; ~20 uses</a:t>
+              <a:t>	&gt; ~20 uses</a:t>
             </a:r>
           </a:p>
           <a:p>
@@ -2828,18 +2547,14 @@
           </a:p>
           <a:p>
             <a:r>
-              <a:rPr lang="en-US" dirty="0" smtClean="0"/>
+              <a:rPr lang="en-US" dirty="0"/>
               <a:t>Cost increases due to refurbishment: </a:t>
             </a:r>
           </a:p>
           <a:p>
             <a:r>
               <a:rPr lang="en-US" dirty="0"/>
-              <a:t>	</a:t>
-            </a:r>
-            <a:r>
-              <a:rPr lang="en-US" dirty="0" smtClean="0"/>
-              <a:t>&gt; ~60 uses</a:t>
+              <a:t>	&gt; ~60 uses</a:t>
             </a:r>
           </a:p>
         </p:txBody>
@@ -2867,18 +2582,13 @@
           <a:lstStyle/>
           <a:p>
             <a:r>
-              <a:rPr lang="en-US" dirty="0" smtClean="0">
+              <a:rPr lang="en-US" dirty="0">
                 <a:solidFill>
                   <a:srgbClr val="FF0000"/>
                 </a:solidFill>
               </a:rPr>
               <a:t>TODO</a:t>
             </a:r>
-            <a:endParaRPr lang="en-US" dirty="0">
-              <a:solidFill>
-                <a:srgbClr val="FF0000"/>
-              </a:solidFill>
-            </a:endParaRPr>
           </a:p>
         </p:txBody>
       </p:sp>
@@ -2892,13 +2602,6 @@
   <p:clrMapOvr>
     <a:masterClrMapping/>
   </p:clrMapOvr>
-  <p:timing>
-    <p:tnLst>
-      <p:par>
-        <p:cTn id="1" dur="indefinite" restart="never" nodeType="tmRoot"/>
-      </p:par>
-    </p:tnLst>
-  </p:timing>
 </p:sld>
 </file>
 
@@ -2994,18 +2697,9 @@
           <a:lstStyle/>
           <a:p>
             <a:r>
-              <a:rPr lang="en-US" dirty="0" smtClean="0"/>
-              <a:t>Reuse is only viable for </a:t>
-            </a:r>
-            <a:r>
-              <a:rPr lang="en-US" dirty="0" smtClean="0"/>
-              <a:t>medium to heavy launch </a:t>
-            </a:r>
-            <a:r>
-              <a:rPr lang="en-US" dirty="0" smtClean="0"/>
-              <a:t>vehicles</a:t>
-            </a:r>
-            <a:endParaRPr lang="en-US" dirty="0"/>
+              <a:rPr lang="en-US" dirty="0"/>
+              <a:t>Reuse is only viable for medium to heavy launch vehicles</a:t>
+            </a:r>
           </a:p>
         </p:txBody>
       </p:sp>
@@ -3296,7 +2990,7 @@
               <a:buNone/>
             </a:pPr>
             <a:r>
-              <a:rPr lang="en-US" dirty="0" smtClean="0">
+              <a:rPr lang="en-US" dirty="0">
                 <a:solidFill>
                   <a:schemeClr val="tx1">
                     <a:lumMod val="50000"/>
@@ -3308,13 +3002,13 @@
               <a:t>Intro | 1. Production costs | 2. Lowest-cost strategy |</a:t>
             </a:r>
             <a:r>
-              <a:rPr lang="en-US" b="1" dirty="0" smtClean="0">
+              <a:rPr lang="en-US" b="1" dirty="0">
                 <a:latin typeface="+mj-lt"/>
               </a:rPr>
               <a:t> 3. Conditions for reuse viability</a:t>
             </a:r>
             <a:r>
-              <a:rPr lang="en-US" dirty="0" smtClean="0">
+              <a:rPr lang="en-US" dirty="0">
                 <a:solidFill>
                   <a:schemeClr val="tx1">
                     <a:lumMod val="50000"/>
@@ -3325,15 +3019,6 @@
               </a:rPr>
               <a:t> | Conclusion</a:t>
             </a:r>
-            <a:endParaRPr lang="en-US" dirty="0">
-              <a:solidFill>
-                <a:schemeClr val="tx1">
-                  <a:lumMod val="50000"/>
-                  <a:lumOff val="50000"/>
-                </a:schemeClr>
-              </a:solidFill>
-              <a:latin typeface="+mj-lt"/>
-            </a:endParaRPr>
           </a:p>
         </p:txBody>
       </p:sp>
@@ -3394,7 +3079,7 @@
           <a:lstStyle/>
           <a:p>
             <a:r>
-              <a:rPr lang="en-US" sz="1200" dirty="0" smtClean="0">
+              <a:rPr lang="en-US" sz="1200" dirty="0">
                 <a:latin typeface="DejaVu Sans" panose="020B0603030804020204" pitchFamily="34" charset="0"/>
                 <a:ea typeface="DejaVu Sans" panose="020B0603030804020204" pitchFamily="34" charset="0"/>
                 <a:cs typeface="DejaVu Sans" panose="020B0603030804020204" pitchFamily="34" charset="0"/>
@@ -3404,50 +3089,13 @@
           </a:p>
           <a:p>
             <a:r>
-              <a:rPr lang="en-US" sz="1200" dirty="0" smtClean="0">
-                <a:latin typeface="DejaVu Sans" panose="020B0603030804020204" pitchFamily="34" charset="0"/>
-                <a:ea typeface="DejaVu Sans" panose="020B0603030804020204" pitchFamily="34" charset="0"/>
-                <a:cs typeface="DejaVu Sans" panose="020B0603030804020204" pitchFamily="34" charset="0"/>
-              </a:rPr>
-              <a:t>stage 1&amp;2: </a:t>
-            </a:r>
-            <a:r>
               <a:rPr lang="en-US" sz="1200" dirty="0">
                 <a:latin typeface="DejaVu Sans" panose="020B0603030804020204" pitchFamily="34" charset="0"/>
                 <a:ea typeface="DejaVu Sans" panose="020B0603030804020204" pitchFamily="34" charset="0"/>
                 <a:cs typeface="DejaVu Sans" panose="020B0603030804020204" pitchFamily="34" charset="0"/>
               </a:rPr>
-              <a:t>kerosene gas </a:t>
-            </a:r>
-            <a:r>
-              <a:rPr lang="en-US" sz="1200" dirty="0" smtClean="0">
-                <a:latin typeface="DejaVu Sans" panose="020B0603030804020204" pitchFamily="34" charset="0"/>
-                <a:ea typeface="DejaVu Sans" panose="020B0603030804020204" pitchFamily="34" charset="0"/>
-                <a:cs typeface="DejaVu Sans" panose="020B0603030804020204" pitchFamily="34" charset="0"/>
-              </a:rPr>
-              <a:t>gen. </a:t>
-            </a:r>
-            <a:r>
-              <a:rPr lang="en-US" sz="1200" dirty="0">
-                <a:latin typeface="DejaVu Sans" panose="020B0603030804020204" pitchFamily="34" charset="0"/>
-                <a:ea typeface="DejaVu Sans" panose="020B0603030804020204" pitchFamily="34" charset="0"/>
-                <a:cs typeface="DejaVu Sans" panose="020B0603030804020204" pitchFamily="34" charset="0"/>
-              </a:rPr>
-              <a:t>tech</a:t>
-            </a:r>
-            <a:r>
-              <a:rPr lang="en-US" sz="1200" dirty="0" smtClean="0">
-                <a:latin typeface="DejaVu Sans" panose="020B0603030804020204" pitchFamily="34" charset="0"/>
-                <a:ea typeface="DejaVu Sans" panose="020B0603030804020204" pitchFamily="34" charset="0"/>
-                <a:cs typeface="DejaVu Sans" panose="020B0603030804020204" pitchFamily="34" charset="0"/>
-              </a:rPr>
-              <a:t>.</a:t>
-            </a:r>
-            <a:endParaRPr lang="en-US" sz="1200" dirty="0">
-              <a:latin typeface="DejaVu Sans" panose="020B0603030804020204" pitchFamily="34" charset="0"/>
-              <a:ea typeface="DejaVu Sans" panose="020B0603030804020204" pitchFamily="34" charset="0"/>
-              <a:cs typeface="DejaVu Sans" panose="020B0603030804020204" pitchFamily="34" charset="0"/>
-            </a:endParaRPr>
+              <a:t>stage 1&amp;2: kerosene gas gen. tech.</a:t>
+            </a:r>
           </a:p>
         </p:txBody>
       </p:sp>
@@ -3773,10 +3421,9 @@
           <a:lstStyle/>
           <a:p>
             <a:r>
-              <a:rPr lang="en-US" dirty="0" smtClean="0"/>
+              <a:rPr lang="en-US" dirty="0"/>
               <a:t>High launch rates enable reuse development to be paid off</a:t>
             </a:r>
-            <a:endParaRPr lang="en-US" dirty="0"/>
           </a:p>
         </p:txBody>
       </p:sp>
@@ -3995,7 +3642,7 @@
               <a:buNone/>
             </a:pPr>
             <a:r>
-              <a:rPr lang="en-US" dirty="0" smtClean="0">
+              <a:rPr lang="en-US" dirty="0">
                 <a:solidFill>
                   <a:schemeClr val="tx1">
                     <a:lumMod val="50000"/>
@@ -4007,13 +3654,13 @@
               <a:t>Intro | 1. Production costs | 2. Lowest-cost strategy |</a:t>
             </a:r>
             <a:r>
-              <a:rPr lang="en-US" b="1" dirty="0" smtClean="0">
+              <a:rPr lang="en-US" b="1" dirty="0">
                 <a:latin typeface="+mj-lt"/>
               </a:rPr>
               <a:t> 3. Conditions for reuse viability</a:t>
             </a:r>
             <a:r>
-              <a:rPr lang="en-US" dirty="0" smtClean="0">
+              <a:rPr lang="en-US" dirty="0">
                 <a:solidFill>
                   <a:schemeClr val="tx1">
                     <a:lumMod val="50000"/>
@@ -4024,15 +3671,6 @@
               </a:rPr>
               <a:t> | Conclusion</a:t>
             </a:r>
-            <a:endParaRPr lang="en-US" dirty="0">
-              <a:solidFill>
-                <a:schemeClr val="tx1">
-                  <a:lumMod val="50000"/>
-                  <a:lumOff val="50000"/>
-                </a:schemeClr>
-              </a:solidFill>
-              <a:latin typeface="+mj-lt"/>
-            </a:endParaRPr>
           </a:p>
         </p:txBody>
       </p:sp>
@@ -4046,13 +3684,6 @@
   <p:clrMapOvr>
     <a:masterClrMapping/>
   </p:clrMapOvr>
-  <p:timing>
-    <p:tnLst>
-      <p:par>
-        <p:cTn id="1" dur="indefinite" restart="never" nodeType="tmRoot"/>
-      </p:par>
-    </p:tnLst>
-  </p:timing>
 </p:sld>
 </file>
 
@@ -4091,18 +3722,17 @@
           <a:lstStyle/>
           <a:p>
             <a:r>
-              <a:rPr lang="en-US" dirty="0" smtClean="0"/>
+              <a:rPr lang="en-US" dirty="0"/>
               <a:t>Conclusion: Some 1</a:t>
             </a:r>
             <a:r>
-              <a:rPr lang="en-US" baseline="30000" dirty="0" smtClean="0"/>
+              <a:rPr lang="en-US" baseline="30000" dirty="0"/>
               <a:t>st</a:t>
             </a:r>
             <a:r>
-              <a:rPr lang="en-US" dirty="0" smtClean="0"/>
+              <a:rPr lang="en-US" dirty="0"/>
               <a:t> stage reuse strategies, particularly downrange propulsive landing, can be economically worthwhile</a:t>
             </a:r>
-            <a:endParaRPr lang="en-US" dirty="0"/>
           </a:p>
         </p:txBody>
       </p:sp>
@@ -4122,28 +3752,24 @@
           <a:lstStyle/>
           <a:p>
             <a:r>
-              <a:rPr lang="en-US" dirty="0" smtClean="0"/>
+              <a:rPr lang="en-US" dirty="0"/>
               <a:t> Only worthwhile for medium-large launch vehicles, where first stage production costs dominate</a:t>
             </a:r>
             <a:br>
-              <a:rPr lang="en-US" dirty="0" smtClean="0"/>
+              <a:rPr lang="en-US" dirty="0"/>
             </a:br>
-            <a:endParaRPr lang="en-US" dirty="0" smtClean="0"/>
+            <a:endParaRPr lang="en-US" dirty="0"/>
           </a:p>
           <a:p>
             <a:r>
               <a:rPr lang="en-US" dirty="0"/>
-              <a:t> </a:t>
-            </a:r>
-            <a:r>
-              <a:rPr lang="en-US" dirty="0" smtClean="0"/>
-              <a:t>Downrange propulsive landing is likely the lowest-cost strategy</a:t>
+              <a:t> Downrange propulsive landing is likely the lowest-cost strategy</a:t>
             </a:r>
           </a:p>
           <a:p>
             <a:pPr lvl="1"/>
             <a:r>
-              <a:rPr lang="en-US" dirty="0" smtClean="0"/>
+              <a:rPr lang="en-US" dirty="0"/>
               <a:t> Partial (engines-only) reuse strategies have small potential savings</a:t>
             </a:r>
           </a:p>
@@ -4151,23 +3777,18 @@
             <a:pPr lvl="1"/>
             <a:r>
               <a:rPr lang="en-US" dirty="0"/>
-              <a:t> </a:t>
-            </a:r>
-            <a:r>
-              <a:rPr lang="en-US" dirty="0" smtClean="0"/>
-              <a:t>Winged stages have uncertain (and probably high) production costs</a:t>
+              <a:t> Winged stages have uncertain (and probably high) production costs</a:t>
             </a:r>
             <a:br>
-              <a:rPr lang="en-US" dirty="0" smtClean="0"/>
+              <a:rPr lang="en-US" dirty="0"/>
             </a:br>
-            <a:endParaRPr lang="en-US" dirty="0" smtClean="0"/>
-          </a:p>
-          <a:p>
-            <a:r>
-              <a:rPr lang="en-US" dirty="0" smtClean="0"/>
+            <a:endParaRPr lang="en-US" dirty="0"/>
+          </a:p>
+          <a:p>
+            <a:r>
+              <a:rPr lang="en-US" dirty="0"/>
               <a:t> High launch rates (&gt; 20/year) are likely needed to pay off development costs</a:t>
             </a:r>
-            <a:endParaRPr lang="en-US" dirty="0"/>
           </a:p>
         </p:txBody>
       </p:sp>
@@ -4386,7 +4007,7 @@
               <a:buNone/>
             </a:pPr>
             <a:r>
-              <a:rPr lang="en-US" dirty="0" smtClean="0">
+              <a:rPr lang="en-US" dirty="0">
                 <a:solidFill>
                   <a:schemeClr val="tx1">
                     <a:lumMod val="50000"/>
@@ -4398,13 +4019,13 @@
               <a:t>Intro | 1. Production costs | 2. Lowest-cost strategy |</a:t>
             </a:r>
             <a:r>
-              <a:rPr lang="en-US" b="1" dirty="0" smtClean="0">
+              <a:rPr lang="en-US" b="1" dirty="0">
                 <a:latin typeface="+mj-lt"/>
               </a:rPr>
               <a:t> </a:t>
             </a:r>
             <a:r>
-              <a:rPr lang="en-US" dirty="0" smtClean="0">
+              <a:rPr lang="en-US" dirty="0">
                 <a:solidFill>
                   <a:schemeClr val="tx1">
                     <a:lumMod val="50000"/>
@@ -4416,14 +4037,11 @@
               <a:t>3. Conditions for reuse viability | </a:t>
             </a:r>
             <a:r>
-              <a:rPr lang="en-US" b="1" dirty="0" smtClean="0">
+              <a:rPr lang="en-US" b="1" dirty="0">
                 <a:latin typeface="+mj-lt"/>
               </a:rPr>
               <a:t>Conclusion</a:t>
             </a:r>
-            <a:endParaRPr lang="en-US" b="1" dirty="0">
-              <a:latin typeface="+mj-lt"/>
-            </a:endParaRPr>
           </a:p>
         </p:txBody>
       </p:sp>
@@ -4437,13 +4055,6 @@
   <p:clrMapOvr>
     <a:masterClrMapping/>
   </p:clrMapOvr>
-  <p:timing>
-    <p:tnLst>
-      <p:par>
-        <p:cTn id="1" dur="indefinite" restart="never" nodeType="tmRoot"/>
-      </p:par>
-    </p:tnLst>
-  </p:timing>
 </p:sld>
 </file>
 
@@ -4480,10 +4091,9 @@
           <a:lstStyle/>
           <a:p>
             <a:r>
-              <a:rPr lang="en-US" dirty="0" smtClean="0"/>
+              <a:rPr lang="en-US" dirty="0"/>
               <a:t>Some launch providers are moving towards reusability</a:t>
             </a:r>
-            <a:endParaRPr lang="en-US" dirty="0"/>
           </a:p>
         </p:txBody>
       </p:sp>
@@ -4511,7 +4121,7 @@
               <a:buNone/>
             </a:pPr>
             <a:r>
-              <a:rPr lang="en-US" dirty="0" smtClean="0"/>
+              <a:rPr lang="en-US" dirty="0"/>
               <a:t>Will providers of expendable launch vehicles be left behind?</a:t>
             </a:r>
           </a:p>
@@ -4526,10 +4136,9 @@
               <a:buNone/>
             </a:pPr>
             <a:r>
-              <a:rPr lang="en-US" dirty="0" smtClean="0"/>
+              <a:rPr lang="en-US" dirty="0"/>
               <a:t>… or are these development efforts wasting billions?</a:t>
             </a:r>
-            <a:endParaRPr lang="en-US" dirty="0"/>
           </a:p>
         </p:txBody>
       </p:sp>
@@ -4712,23 +4321,22 @@
           <a:lstStyle/>
           <a:p>
             <a:r>
-              <a:rPr lang="en-US" sz="1200" dirty="0" err="1" smtClean="0"/>
+              <a:rPr lang="en-US" sz="1200" dirty="0" err="1"/>
               <a:t>SpaceX</a:t>
             </a:r>
-            <a:endParaRPr lang="en-US" sz="1200" dirty="0" smtClean="0"/>
-          </a:p>
-          <a:p>
-            <a:r>
-              <a:rPr lang="en-US" sz="1200" dirty="0" smtClean="0"/>
+            <a:endParaRPr lang="en-US" sz="1200" dirty="0"/>
+          </a:p>
+          <a:p>
+            <a:r>
+              <a:rPr lang="en-US" sz="1200" dirty="0"/>
               <a:t>Falcon 9</a:t>
             </a:r>
           </a:p>
           <a:p>
             <a:r>
-              <a:rPr lang="en-US" sz="1200" dirty="0" smtClean="0"/>
+              <a:rPr lang="en-US" sz="1200" dirty="0"/>
               <a:t>Operational</a:t>
             </a:r>
-            <a:endParaRPr lang="en-US" sz="1200" dirty="0"/>
           </a:p>
         </p:txBody>
       </p:sp>
@@ -4755,22 +4363,21 @@
           <a:lstStyle/>
           <a:p>
             <a:r>
-              <a:rPr lang="en-US" sz="1200" dirty="0" smtClean="0"/>
+              <a:rPr lang="en-US" sz="1200" dirty="0"/>
               <a:t>Blue Origin</a:t>
             </a:r>
           </a:p>
           <a:p>
             <a:r>
-              <a:rPr lang="en-US" sz="1200" dirty="0" smtClean="0"/>
+              <a:rPr lang="en-US" sz="1200" dirty="0"/>
               <a:t>New Glenn</a:t>
             </a:r>
           </a:p>
           <a:p>
             <a:r>
-              <a:rPr lang="en-US" sz="1200" dirty="0" smtClean="0"/>
+              <a:rPr lang="en-US" sz="1200" dirty="0"/>
               <a:t>In development</a:t>
             </a:r>
-            <a:endParaRPr lang="en-US" sz="1200" dirty="0"/>
           </a:p>
         </p:txBody>
       </p:sp>
@@ -4797,22 +4404,21 @@
           <a:lstStyle/>
           <a:p>
             <a:r>
-              <a:rPr lang="en-US" sz="1200" dirty="0" smtClean="0"/>
+              <a:rPr lang="en-US" sz="1200" dirty="0"/>
               <a:t>ULA</a:t>
             </a:r>
           </a:p>
           <a:p>
             <a:r>
-              <a:rPr lang="en-US" sz="1200" dirty="0" smtClean="0"/>
+              <a:rPr lang="en-US" sz="1200" dirty="0"/>
               <a:t>Vulcan SMART reuse</a:t>
             </a:r>
           </a:p>
           <a:p>
             <a:r>
-              <a:rPr lang="en-US" sz="1200" dirty="0" smtClean="0"/>
+              <a:rPr lang="en-US" sz="1200" dirty="0"/>
               <a:t>In development</a:t>
             </a:r>
-            <a:endParaRPr lang="en-US" sz="1200" dirty="0"/>
           </a:p>
         </p:txBody>
       </p:sp>
@@ -4839,22 +4445,21 @@
           <a:lstStyle/>
           <a:p>
             <a:r>
-              <a:rPr lang="en-US" sz="1200" dirty="0" smtClean="0"/>
+              <a:rPr lang="en-US" sz="1200" dirty="0"/>
               <a:t>Boeing</a:t>
             </a:r>
           </a:p>
           <a:p>
             <a:r>
-              <a:rPr lang="en-US" sz="1200" dirty="0" smtClean="0"/>
+              <a:rPr lang="en-US" sz="1200" dirty="0"/>
               <a:t>XS-1 Phantom Express</a:t>
             </a:r>
           </a:p>
           <a:p>
             <a:r>
-              <a:rPr lang="en-US" sz="1200" dirty="0" smtClean="0"/>
+              <a:rPr lang="en-US" sz="1200" dirty="0"/>
               <a:t>In development</a:t>
             </a:r>
-            <a:endParaRPr lang="en-US" sz="1200" dirty="0"/>
           </a:p>
         </p:txBody>
       </p:sp>
@@ -5073,13 +4678,13 @@
               <a:buNone/>
             </a:pPr>
             <a:r>
-              <a:rPr lang="en-US" b="1" dirty="0" smtClean="0">
+              <a:rPr lang="en-US" b="1" dirty="0">
                 <a:latin typeface="+mj-lt"/>
               </a:rPr>
               <a:t>Intro</a:t>
             </a:r>
             <a:r>
-              <a:rPr lang="en-US" dirty="0" smtClean="0">
+              <a:rPr lang="en-US" dirty="0">
                 <a:solidFill>
                   <a:schemeClr val="tx1">
                     <a:lumMod val="50000"/>
@@ -5090,15 +4695,6 @@
               </a:rPr>
               <a:t> | 1. Production costs | 2. Lowest-cost strategy | 3. Conditions for reuse viability | Conclusion</a:t>
             </a:r>
-            <a:endParaRPr lang="en-US" dirty="0">
-              <a:solidFill>
-                <a:schemeClr val="tx1">
-                  <a:lumMod val="50000"/>
-                  <a:lumOff val="50000"/>
-                </a:schemeClr>
-              </a:solidFill>
-              <a:latin typeface="+mj-lt"/>
-            </a:endParaRPr>
           </a:p>
         </p:txBody>
       </p:sp>
@@ -5112,13 +4708,6 @@
   <p:clrMapOvr>
     <a:masterClrMapping/>
   </p:clrMapOvr>
-  <p:timing>
-    <p:tnLst>
-      <p:par>
-        <p:cTn id="1" dur="indefinite" restart="never" nodeType="tmRoot"/>
-      </p:par>
-    </p:tnLst>
-  </p:timing>
 </p:sld>
 </file>
 
@@ -5155,10 +4744,9 @@
           <a:lstStyle/>
           <a:p>
             <a:r>
-              <a:rPr lang="en-US" dirty="0" smtClean="0"/>
+              <a:rPr lang="en-US" dirty="0"/>
               <a:t>Many first stage reuse strategies have been proposed …</a:t>
             </a:r>
-            <a:endParaRPr lang="en-US" dirty="0"/>
           </a:p>
         </p:txBody>
       </p:sp>
@@ -5223,10 +4811,9 @@
             <a:lstStyle/>
             <a:p>
               <a:r>
-                <a:rPr lang="en-US" sz="1400" dirty="0" smtClean="0"/>
+                <a:rPr lang="en-US" sz="1400" dirty="0"/>
                 <a:t>Launch site recovery</a:t>
               </a:r>
-              <a:endParaRPr lang="en-US" sz="1400" dirty="0"/>
             </a:p>
           </p:txBody>
         </p:sp>
@@ -5283,10 +4870,9 @@
             <a:lstStyle/>
             <a:p>
               <a:r>
-                <a:rPr lang="en-US" sz="1400" dirty="0" smtClean="0"/>
+                <a:rPr lang="en-US" sz="1400" dirty="0"/>
                 <a:t>Downrange recovery</a:t>
               </a:r>
-              <a:endParaRPr lang="en-US" sz="1400" dirty="0"/>
             </a:p>
           </p:txBody>
         </p:sp>
@@ -5405,10 +4991,9 @@
             <a:lstStyle/>
             <a:p>
               <a:r>
-                <a:rPr lang="en-US" sz="1200" dirty="0" smtClean="0"/>
+                <a:rPr lang="en-US" sz="1200" dirty="0"/>
                 <a:t>Falcon 9</a:t>
               </a:r>
-              <a:endParaRPr lang="en-US" sz="1200" dirty="0"/>
             </a:p>
           </p:txBody>
         </p:sp>
@@ -5435,16 +5020,15 @@
             <a:lstStyle/>
             <a:p>
               <a:r>
-                <a:rPr lang="en-US" sz="1200" dirty="0" smtClean="0"/>
+                <a:rPr lang="en-US" sz="1200" dirty="0"/>
                 <a:t>USAF RBS</a:t>
               </a:r>
             </a:p>
             <a:p>
               <a:r>
-                <a:rPr lang="en-US" sz="1200" dirty="0" smtClean="0"/>
+                <a:rPr lang="en-US" sz="1200" dirty="0"/>
                 <a:t>Baikal</a:t>
               </a:r>
-              <a:endParaRPr lang="en-US" sz="1200" dirty="0"/>
             </a:p>
           </p:txBody>
         </p:sp>
@@ -5471,16 +5055,15 @@
             <a:lstStyle/>
             <a:p>
               <a:r>
-                <a:rPr lang="en-US" sz="1200" dirty="0" smtClean="0"/>
+                <a:rPr lang="en-US" sz="1200" dirty="0"/>
                 <a:t>Falcon 9</a:t>
               </a:r>
             </a:p>
             <a:p>
               <a:r>
-                <a:rPr lang="en-US" sz="1200" dirty="0" smtClean="0"/>
+                <a:rPr lang="en-US" sz="1200" dirty="0"/>
                 <a:t>New Glenn</a:t>
               </a:r>
-              <a:endParaRPr lang="en-US" sz="1200" dirty="0"/>
             </a:p>
           </p:txBody>
         </p:sp>
@@ -5507,10 +5090,9 @@
             <a:lstStyle/>
             <a:p>
               <a:r>
-                <a:rPr lang="en-US" sz="1200" dirty="0" smtClean="0"/>
+                <a:rPr lang="en-US" sz="1200" dirty="0"/>
                 <a:t>Ares I</a:t>
               </a:r>
-              <a:endParaRPr lang="en-US" sz="1200" dirty="0"/>
             </a:p>
           </p:txBody>
         </p:sp>
@@ -5537,10 +5119,9 @@
             <a:lstStyle/>
             <a:p>
               <a:r>
-                <a:rPr lang="en-US" sz="1200" dirty="0" smtClean="0"/>
+                <a:rPr lang="en-US" sz="1200" dirty="0"/>
                 <a:t>XS-1 Phantom Express</a:t>
               </a:r>
-              <a:endParaRPr lang="en-US" sz="1200" dirty="0"/>
             </a:p>
           </p:txBody>
         </p:sp>
@@ -5567,10 +5148,9 @@
             <a:lstStyle/>
             <a:p>
               <a:r>
-                <a:rPr lang="en-US" sz="1200" dirty="0" smtClean="0"/>
+                <a:rPr lang="en-US" sz="1200" dirty="0"/>
                 <a:t>Vulcan SMART</a:t>
               </a:r>
-              <a:endParaRPr lang="en-US" sz="1200" dirty="0"/>
             </a:p>
           </p:txBody>
         </p:sp>
@@ -5597,10 +5177,9 @@
             <a:lstStyle/>
             <a:p>
               <a:r>
-                <a:rPr lang="en-US" sz="1200" i="1" dirty="0" smtClean="0"/>
+                <a:rPr lang="en-US" sz="1200" i="1" dirty="0"/>
                 <a:t>Examples:</a:t>
               </a:r>
-              <a:endParaRPr lang="en-US" sz="1200" i="1" dirty="0"/>
             </a:p>
           </p:txBody>
         </p:sp>
@@ -5628,7 +5207,7 @@
           <a:lstStyle/>
           <a:p>
             <a:r>
-              <a:rPr lang="en-US" dirty="0" smtClean="0"/>
+              <a:rPr lang="en-US" dirty="0"/>
               <a:t>… but their performance and cost have not been (publically) compared under a common framework</a:t>
             </a:r>
           </a:p>
@@ -5637,10 +5216,9 @@
           </a:p>
           <a:p>
             <a:r>
-              <a:rPr lang="en-US" dirty="0" smtClean="0"/>
+              <a:rPr lang="en-US" dirty="0"/>
               <a:t>… and there remains controversy as to which, if any, are economically worthwhile</a:t>
             </a:r>
-            <a:endParaRPr lang="en-US" dirty="0"/>
           </a:p>
         </p:txBody>
       </p:sp>
@@ -5835,13 +5413,13 @@
               <a:buNone/>
             </a:pPr>
             <a:r>
-              <a:rPr lang="en-US" b="1" dirty="0" smtClean="0">
+              <a:rPr lang="en-US" b="1" dirty="0">
                 <a:latin typeface="+mj-lt"/>
               </a:rPr>
               <a:t>Intro</a:t>
             </a:r>
             <a:r>
-              <a:rPr lang="en-US" dirty="0" smtClean="0">
+              <a:rPr lang="en-US" dirty="0">
                 <a:solidFill>
                   <a:schemeClr val="tx1">
                     <a:lumMod val="50000"/>
@@ -5852,15 +5430,6 @@
               </a:rPr>
               <a:t> | 1. Production costs | 2. Lowest-cost strategy | 3. Conditions for reuse viability | Conclusion</a:t>
             </a:r>
-            <a:endParaRPr lang="en-US" dirty="0">
-              <a:solidFill>
-                <a:schemeClr val="tx1">
-                  <a:lumMod val="50000"/>
-                  <a:lumOff val="50000"/>
-                </a:schemeClr>
-              </a:solidFill>
-              <a:latin typeface="+mj-lt"/>
-            </a:endParaRPr>
           </a:p>
         </p:txBody>
       </p:sp>
@@ -6024,7 +5593,7 @@
           <a:lstStyle/>
           <a:p>
             <a:r>
-              <a:rPr lang="en-US" dirty="0" smtClean="0"/>
+              <a:rPr lang="en-US" dirty="0"/>
               <a:t> Classify reuse strategies</a:t>
             </a:r>
           </a:p>
@@ -6032,44 +5601,39 @@
             <a:pPr marL="0" indent="0">
               <a:buNone/>
             </a:pPr>
-            <a:endParaRPr lang="en-US" dirty="0" smtClean="0"/>
+            <a:endParaRPr lang="en-US" dirty="0"/>
           </a:p>
           <a:p>
             <a:r>
               <a:rPr lang="en-US" dirty="0"/>
-              <a:t> </a:t>
-            </a:r>
-            <a:r>
-              <a:rPr lang="en-US" dirty="0" smtClean="0"/>
-              <a:t>Model performance: </a:t>
-            </a:r>
-            <a:r>
-              <a:rPr lang="en-US" dirty="0" err="1" smtClean="0"/>
+              <a:t> Model performance: </a:t>
+            </a:r>
+            <a:r>
+              <a:rPr lang="en-US" dirty="0" err="1"/>
               <a:t>Tsiolkovsky</a:t>
             </a:r>
-            <a:endParaRPr lang="en-US" dirty="0" smtClean="0"/>
+            <a:endParaRPr lang="en-US" dirty="0"/>
           </a:p>
           <a:p>
             <a:pPr marL="0" indent="0">
               <a:buNone/>
             </a:pPr>
-            <a:endParaRPr lang="en-US" dirty="0" smtClean="0"/>
-          </a:p>
-          <a:p>
-            <a:r>
-              <a:rPr lang="en-US" dirty="0" smtClean="0"/>
+            <a:endParaRPr lang="en-US" dirty="0"/>
+          </a:p>
+          <a:p>
+            <a:r>
+              <a:rPr lang="en-US" dirty="0"/>
               <a:t> Model cost: TRANSCOST 8.2</a:t>
             </a:r>
           </a:p>
           <a:p>
-            <a:endParaRPr lang="en-US" dirty="0" smtClean="0"/>
-          </a:p>
-          <a:p>
-            <a:r>
-              <a:rPr lang="en-US" dirty="0" smtClean="0"/>
+            <a:endParaRPr lang="en-US" dirty="0"/>
+          </a:p>
+          <a:p>
+            <a:r>
+              <a:rPr lang="en-US" dirty="0"/>
               <a:t> Quantify uncertainty: Monte Carlo methods</a:t>
             </a:r>
-            <a:endParaRPr lang="en-US" dirty="0"/>
           </a:p>
         </p:txBody>
       </p:sp>
@@ -6288,13 +5852,13 @@
               <a:buNone/>
             </a:pPr>
             <a:r>
-              <a:rPr lang="en-US" b="1" dirty="0" smtClean="0">
+              <a:rPr lang="en-US" b="1" dirty="0">
                 <a:latin typeface="+mj-lt"/>
               </a:rPr>
               <a:t>Intro</a:t>
             </a:r>
             <a:r>
-              <a:rPr lang="en-US" dirty="0" smtClean="0">
+              <a:rPr lang="en-US" dirty="0">
                 <a:solidFill>
                   <a:schemeClr val="tx1">
                     <a:lumMod val="50000"/>
@@ -6305,15 +5869,6 @@
               </a:rPr>
               <a:t> | 1. Production costs | 2. Lowest-cost strategy | 3. Conditions for reuse viability | Conclusion</a:t>
             </a:r>
-            <a:endParaRPr lang="en-US" dirty="0">
-              <a:solidFill>
-                <a:schemeClr val="tx1">
-                  <a:lumMod val="50000"/>
-                  <a:lumOff val="50000"/>
-                </a:schemeClr>
-              </a:solidFill>
-              <a:latin typeface="+mj-lt"/>
-            </a:endParaRPr>
           </a:p>
         </p:txBody>
       </p:sp>
@@ -6327,13 +5882,6 @@
   <p:clrMapOvr>
     <a:masterClrMapping/>
   </p:clrMapOvr>
-  <p:timing>
-    <p:tnLst>
-      <p:par>
-        <p:cTn id="1" dur="indefinite" restart="never" nodeType="tmRoot"/>
-      </p:par>
-    </p:tnLst>
-  </p:timing>
 </p:sld>
 </file>
 
@@ -6370,10 +5918,9 @@
           <a:lstStyle/>
           <a:p>
             <a:r>
-              <a:rPr lang="en-US" dirty="0" smtClean="0"/>
+              <a:rPr lang="en-US" dirty="0"/>
               <a:t>First stage reuse can be economically worthwhile</a:t>
             </a:r>
-            <a:endParaRPr lang="en-US" dirty="0"/>
           </a:p>
         </p:txBody>
       </p:sp>
@@ -6397,13 +5944,13 @@
               <a:buAutoNum type="arabicPeriod"/>
             </a:pPr>
             <a:r>
-              <a:rPr lang="en-US" dirty="0" smtClean="0"/>
+              <a:rPr lang="en-US" dirty="0"/>
               <a:t>First stage production cost drives the high cost per flight of expendable vehicles (for large vehicles)</a:t>
             </a:r>
             <a:br>
-              <a:rPr lang="en-US" dirty="0" smtClean="0"/>
+              <a:rPr lang="en-US" dirty="0"/>
             </a:br>
-            <a:endParaRPr lang="en-US" dirty="0" smtClean="0"/>
+            <a:endParaRPr lang="en-US" dirty="0"/>
           </a:p>
           <a:p>
             <a:pPr marL="514350" indent="-514350">
@@ -6411,13 +5958,13 @@
               <a:buAutoNum type="arabicPeriod"/>
             </a:pPr>
             <a:r>
-              <a:rPr lang="en-US" dirty="0" smtClean="0"/>
+              <a:rPr lang="en-US" dirty="0"/>
               <a:t>Downrange propulsive landing is likely the lowest-cost strategy</a:t>
             </a:r>
             <a:br>
-              <a:rPr lang="en-US" dirty="0" smtClean="0"/>
+              <a:rPr lang="en-US" dirty="0"/>
             </a:br>
-            <a:endParaRPr lang="en-US" dirty="0" smtClean="0"/>
+            <a:endParaRPr lang="en-US" dirty="0"/>
           </a:p>
           <a:p>
             <a:pPr marL="514350" indent="-514350">
@@ -6425,15 +5972,15 @@
               <a:buAutoNum type="arabicPeriod"/>
             </a:pPr>
             <a:r>
-              <a:rPr lang="en-US" dirty="0" smtClean="0"/>
+              <a:rPr lang="en-US" dirty="0"/>
               <a:t>1</a:t>
             </a:r>
             <a:r>
-              <a:rPr lang="en-US" baseline="30000" dirty="0" smtClean="0"/>
+              <a:rPr lang="en-US" baseline="30000" dirty="0"/>
               <a:t>st</a:t>
             </a:r>
             <a:r>
-              <a:rPr lang="en-US" dirty="0" smtClean="0"/>
+              <a:rPr lang="en-US" dirty="0"/>
               <a:t> stage reuse is worthwhile only for large payloads and high launch rates</a:t>
             </a:r>
           </a:p>
@@ -6661,13 +6208,13 @@
               <a:buNone/>
             </a:pPr>
             <a:r>
-              <a:rPr lang="en-US" b="1" dirty="0" smtClean="0">
+              <a:rPr lang="en-US" b="1" dirty="0">
                 <a:latin typeface="+mj-lt"/>
               </a:rPr>
               <a:t>Intro</a:t>
             </a:r>
             <a:r>
-              <a:rPr lang="en-US" dirty="0" smtClean="0">
+              <a:rPr lang="en-US" dirty="0">
                 <a:solidFill>
                   <a:schemeClr val="tx1">
                     <a:lumMod val="50000"/>
@@ -6678,15 +6225,6 @@
               </a:rPr>
               <a:t> | 1. Production costs | 2. Lowest-cost strategy | 3. Conditions for reuse viability | Conclusion</a:t>
             </a:r>
-            <a:endParaRPr lang="en-US" dirty="0">
-              <a:solidFill>
-                <a:schemeClr val="tx1">
-                  <a:lumMod val="50000"/>
-                  <a:lumOff val="50000"/>
-                </a:schemeClr>
-              </a:solidFill>
-              <a:latin typeface="+mj-lt"/>
-            </a:endParaRPr>
           </a:p>
         </p:txBody>
       </p:sp>
@@ -6700,13 +6238,6 @@
   <p:clrMapOvr>
     <a:masterClrMapping/>
   </p:clrMapOvr>
-  <p:timing>
-    <p:tnLst>
-      <p:par>
-        <p:cTn id="1" dur="indefinite" restart="never" nodeType="tmRoot"/>
-      </p:par>
-    </p:tnLst>
-  </p:timing>
 </p:sld>
 </file>
 
@@ -6743,10 +6274,9 @@
           <a:lstStyle/>
           <a:p>
             <a:r>
-              <a:rPr lang="en-US" dirty="0" smtClean="0"/>
+              <a:rPr lang="en-US" dirty="0"/>
               <a:t>Cost model estimates are credible</a:t>
             </a:r>
-            <a:endParaRPr lang="en-US" dirty="0"/>
           </a:p>
         </p:txBody>
       </p:sp>
@@ -6800,7 +6330,7 @@
               <a:buNone/>
             </a:pPr>
             <a:r>
-              <a:rPr lang="en-US" dirty="0" smtClean="0">
+              <a:rPr lang="en-US" dirty="0">
                 <a:solidFill>
                   <a:schemeClr val="tx1">
                     <a:lumMod val="50000"/>
@@ -6812,25 +6342,13 @@
               <a:t>Intro | </a:t>
             </a:r>
             <a:r>
-              <a:rPr lang="en-US" b="1" dirty="0" smtClean="0">
-                <a:latin typeface="+mj-lt"/>
-              </a:rPr>
-              <a:t>1. </a:t>
-            </a:r>
-            <a:r>
               <a:rPr lang="en-US" b="1" dirty="0">
                 <a:latin typeface="+mj-lt"/>
               </a:rPr>
-              <a:t>P</a:t>
-            </a:r>
-            <a:r>
-              <a:rPr lang="en-US" b="1" dirty="0" smtClean="0">
-                <a:latin typeface="+mj-lt"/>
-              </a:rPr>
-              <a:t>roduction costs </a:t>
-            </a:r>
-            <a:r>
-              <a:rPr lang="en-US" dirty="0" smtClean="0">
+              <a:t>1. Production costs </a:t>
+            </a:r>
+            <a:r>
+              <a:rPr lang="en-US" dirty="0">
                 <a:solidFill>
                   <a:schemeClr val="tx1">
                     <a:lumMod val="50000"/>
@@ -6841,15 +6359,6 @@
               </a:rPr>
               <a:t>| 2. Lowest-cost strategy | 3. Conditions for reuse viability | Conclusion</a:t>
             </a:r>
-            <a:endParaRPr lang="en-US" dirty="0">
-              <a:solidFill>
-                <a:schemeClr val="tx1">
-                  <a:lumMod val="50000"/>
-                  <a:lumOff val="50000"/>
-                </a:schemeClr>
-              </a:solidFill>
-              <a:latin typeface="+mj-lt"/>
-            </a:endParaRPr>
           </a:p>
         </p:txBody>
       </p:sp>
@@ -6893,13 +6402,6 @@
   <p:clrMapOvr>
     <a:masterClrMapping/>
   </p:clrMapOvr>
-  <p:timing>
-    <p:tnLst>
-      <p:par>
-        <p:cTn id="1" dur="indefinite" restart="never" nodeType="tmRoot"/>
-      </p:par>
-    </p:tnLst>
-  </p:timing>
 </p:sld>
 </file>
 
@@ -6938,7 +6440,7 @@
           <a:lstStyle/>
           <a:p>
             <a:r>
-              <a:rPr lang="en-US" dirty="0" smtClean="0"/>
+              <a:rPr lang="en-US" dirty="0"/>
               <a:t>First stage production cost drives cost per flight</a:t>
             </a:r>
             <a:endParaRPr lang="en-US" sz="2700" dirty="0"/>
@@ -7087,10 +6589,9 @@
           <a:lstStyle/>
           <a:p>
             <a:r>
-              <a:rPr lang="en-US" dirty="0" smtClean="0"/>
+              <a:rPr lang="en-US" dirty="0"/>
               <a:t>reuse</a:t>
             </a:r>
-            <a:endParaRPr lang="en-US" dirty="0"/>
           </a:p>
         </p:txBody>
       </p:sp>
@@ -7117,18 +6618,13 @@
           <a:lstStyle/>
           <a:p>
             <a:r>
-              <a:rPr lang="en-US" dirty="0" smtClean="0">
+              <a:rPr lang="en-US" dirty="0">
                 <a:solidFill>
                   <a:srgbClr val="FF0000"/>
                 </a:solidFill>
               </a:rPr>
               <a:t>TODO</a:t>
             </a:r>
-            <a:endParaRPr lang="en-US" dirty="0">
-              <a:solidFill>
-                <a:srgbClr val="FF0000"/>
-              </a:solidFill>
-            </a:endParaRPr>
           </a:p>
         </p:txBody>
       </p:sp>
@@ -7323,7 +6819,7 @@
               <a:buNone/>
             </a:pPr>
             <a:r>
-              <a:rPr lang="en-US" dirty="0" smtClean="0">
+              <a:rPr lang="en-US" dirty="0">
                 <a:solidFill>
                   <a:schemeClr val="tx1">
                     <a:lumMod val="50000"/>
@@ -7335,13 +6831,13 @@
               <a:t>Intro | </a:t>
             </a:r>
             <a:r>
-              <a:rPr lang="en-US" b="1" dirty="0" smtClean="0">
+              <a:rPr lang="en-US" b="1" dirty="0">
                 <a:latin typeface="+mj-lt"/>
               </a:rPr>
               <a:t>1. Production costs </a:t>
             </a:r>
             <a:r>
-              <a:rPr lang="en-US" dirty="0" smtClean="0">
+              <a:rPr lang="en-US" dirty="0">
                 <a:solidFill>
                   <a:schemeClr val="tx1">
                     <a:lumMod val="50000"/>
@@ -7352,15 +6848,6 @@
               </a:rPr>
               <a:t>| 2. Lowest-cost strategy | 3. Conditions for reuse viability | Conclusion</a:t>
             </a:r>
-            <a:endParaRPr lang="en-US" dirty="0">
-              <a:solidFill>
-                <a:schemeClr val="tx1">
-                  <a:lumMod val="50000"/>
-                  <a:lumOff val="50000"/>
-                </a:schemeClr>
-              </a:solidFill>
-              <a:latin typeface="+mj-lt"/>
-            </a:endParaRPr>
           </a:p>
         </p:txBody>
       </p:sp>
@@ -7374,13 +6861,6 @@
   <p:clrMapOvr>
     <a:masterClrMapping/>
   </p:clrMapOvr>
-  <p:timing>
-    <p:tnLst>
-      <p:par>
-        <p:cTn id="1" dur="indefinite" restart="never" nodeType="tmRoot"/>
-      </p:par>
-    </p:tnLst>
-  </p:timing>
 </p:sld>
 </file>
 
@@ -7419,17 +6899,16 @@
           <a:lstStyle/>
           <a:p>
             <a:r>
-              <a:rPr lang="en-US" dirty="0" smtClean="0"/>
+              <a:rPr lang="en-US" dirty="0"/>
               <a:t>Different reuse strategies result in</a:t>
             </a:r>
             <a:br>
-              <a:rPr lang="en-US" dirty="0" smtClean="0"/>
+              <a:rPr lang="en-US" dirty="0"/>
             </a:br>
             <a:r>
-              <a:rPr lang="en-US" dirty="0" smtClean="0"/>
+              <a:rPr lang="en-US" dirty="0"/>
               <a:t>different vehicle masses and costs</a:t>
             </a:r>
-            <a:endParaRPr lang="en-US" dirty="0"/>
           </a:p>
         </p:txBody>
       </p:sp>
@@ -7480,7 +6959,7 @@
           <a:lstStyle/>
           <a:p>
             <a:r>
-              <a:rPr lang="en-US" sz="2200" dirty="0" smtClean="0"/>
+              <a:rPr lang="en-US" sz="2200" dirty="0"/>
               <a:t>Reuse:</a:t>
             </a:r>
           </a:p>
@@ -7494,11 +6973,7 @@
             </a:pPr>
             <a:r>
               <a:rPr lang="en-US" sz="2200" dirty="0"/>
-              <a:t>A</a:t>
-            </a:r>
-            <a:r>
-              <a:rPr lang="en-US" sz="2200" dirty="0" smtClean="0"/>
-              <a:t>dds mass to the first stage</a:t>
+              <a:t>Adds mass to the first stage</a:t>
             </a:r>
           </a:p>
           <a:p>
@@ -7519,7 +6994,7 @@
               <a:buFont typeface="Wingdings" panose="05000000000000000000" pitchFamily="2" charset="2"/>
               <a:buChar char="§"/>
             </a:pPr>
-            <a:endParaRPr lang="en-US" sz="2200" dirty="0" smtClean="0"/>
+            <a:endParaRPr lang="en-US" sz="2200" dirty="0"/>
           </a:p>
           <a:p>
             <a:pPr marL="285750" indent="-285750">
@@ -7529,7 +7004,7 @@
               <a:buFont typeface="Wingdings" panose="05000000000000000000" pitchFamily="2" charset="2"/>
               <a:buChar char="§"/>
             </a:pPr>
-            <a:endParaRPr lang="en-US" sz="2200" dirty="0" smtClean="0"/>
+            <a:endParaRPr lang="en-US" sz="2200" dirty="0"/>
           </a:p>
           <a:p>
             <a:pPr>
@@ -7545,7 +7020,7 @@
                 <a:schemeClr val="accent5"/>
               </a:buClr>
             </a:pPr>
-            <a:endParaRPr lang="en-US" sz="2200" dirty="0" smtClean="0"/>
+            <a:endParaRPr lang="en-US" sz="2200" dirty="0"/>
           </a:p>
           <a:p>
             <a:pPr>
@@ -7553,7 +7028,7 @@
                 <a:schemeClr val="accent5"/>
               </a:buClr>
             </a:pPr>
-            <a:endParaRPr lang="en-US" sz="2200" dirty="0" smtClean="0"/>
+            <a:endParaRPr lang="en-US" sz="2200" dirty="0"/>
           </a:p>
           <a:p>
             <a:pPr marL="285750" indent="-285750">
@@ -7564,10 +7039,9 @@
               <a:buChar char="§"/>
             </a:pPr>
             <a:r>
-              <a:rPr lang="en-US" sz="2200" dirty="0" smtClean="0"/>
+              <a:rPr lang="en-US" sz="2200" dirty="0"/>
               <a:t>Reduces the payload mass fraction</a:t>
             </a:r>
-            <a:endParaRPr lang="en-US" sz="2200" dirty="0"/>
           </a:p>
         </p:txBody>
       </p:sp>
@@ -8081,10 +7555,9 @@
           <a:p>
             <a:pPr algn="ctr"/>
             <a:r>
-              <a:rPr lang="en-US" sz="2200" dirty="0" smtClean="0"/>
+              <a:rPr lang="en-US" sz="2200" dirty="0"/>
               <a:t>Estimate element masses</a:t>
             </a:r>
-            <a:endParaRPr lang="en-US" sz="2200" dirty="0"/>
           </a:p>
         </p:txBody>
       </p:sp>
@@ -8112,10 +7585,9 @@
           <a:p>
             <a:pPr algn="ctr"/>
             <a:r>
-              <a:rPr lang="en-US" sz="2200" dirty="0" smtClean="0"/>
+              <a:rPr lang="en-US" sz="2200" dirty="0"/>
               <a:t>Estimate cost</a:t>
             </a:r>
-            <a:endParaRPr lang="en-US" sz="2200" dirty="0"/>
           </a:p>
         </p:txBody>
       </p:sp>
@@ -8218,10 +7690,9 @@
           <a:lstStyle/>
           <a:p>
             <a:r>
-              <a:rPr lang="en-US" sz="1600" dirty="0" smtClean="0"/>
+              <a:rPr lang="en-US" sz="1600" dirty="0"/>
               <a:t>Payload mass fraction  </a:t>
             </a:r>
-            <a:endParaRPr lang="en-US" sz="1600" dirty="0"/>
           </a:p>
         </p:txBody>
       </p:sp>
@@ -8248,10 +7719,9 @@
           <a:lstStyle/>
           <a:p>
             <a:r>
-              <a:rPr lang="en-US" dirty="0" smtClean="0"/>
+              <a:rPr lang="en-US" dirty="0"/>
               <a:t>=</a:t>
             </a:r>
-            <a:endParaRPr lang="en-US" dirty="0"/>
           </a:p>
         </p:txBody>
       </p:sp>
@@ -8325,10 +7795,9 @@
           <a:p>
             <a:pPr algn="ctr"/>
             <a:r>
-              <a:rPr lang="en-US" sz="2200" dirty="0" smtClean="0"/>
+              <a:rPr lang="en-US" sz="2200" dirty="0"/>
               <a:t>Estimate payload mass fraction</a:t>
             </a:r>
-            <a:endParaRPr lang="en-US" sz="2200" dirty="0"/>
           </a:p>
         </p:txBody>
       </p:sp>
@@ -8355,10 +7824,9 @@
           <a:lstStyle/>
           <a:p>
             <a:r>
-              <a:rPr lang="en-US" sz="1600" dirty="0" smtClean="0"/>
+              <a:rPr lang="en-US" sz="1600" dirty="0"/>
               <a:t>Recovery hardware</a:t>
             </a:r>
-            <a:endParaRPr lang="en-US" sz="1600" dirty="0"/>
           </a:p>
         </p:txBody>
       </p:sp>
@@ -8752,10 +8220,9 @@
           <a:lstStyle/>
           <a:p>
             <a:r>
-              <a:rPr lang="en-US" sz="1600" dirty="0" smtClean="0"/>
+              <a:rPr lang="en-US" sz="1600" dirty="0"/>
               <a:t>Recovery propellant</a:t>
             </a:r>
-            <a:endParaRPr lang="en-US" sz="1600" dirty="0"/>
           </a:p>
         </p:txBody>
       </p:sp>
@@ -8986,7 +8453,7 @@
               <a:buNone/>
             </a:pPr>
             <a:r>
-              <a:rPr lang="en-US" dirty="0" smtClean="0">
+              <a:rPr lang="en-US" dirty="0">
                 <a:solidFill>
                   <a:schemeClr val="tx1">
                     <a:lumMod val="50000"/>
@@ -8998,13 +8465,13 @@
               <a:t>Intro | 1. Production costs | </a:t>
             </a:r>
             <a:r>
-              <a:rPr lang="en-US" b="1" dirty="0" smtClean="0">
+              <a:rPr lang="en-US" b="1" dirty="0">
                 <a:latin typeface="+mj-lt"/>
               </a:rPr>
               <a:t>2. Lowest-cost strategy </a:t>
             </a:r>
             <a:r>
-              <a:rPr lang="en-US" dirty="0" smtClean="0">
+              <a:rPr lang="en-US" dirty="0">
                 <a:solidFill>
                   <a:schemeClr val="tx1">
                     <a:lumMod val="50000"/>
@@ -9015,15 +8482,6 @@
               </a:rPr>
               <a:t>| 3. Conditions for reuse viability | Conclusion</a:t>
             </a:r>
-            <a:endParaRPr lang="en-US" dirty="0">
-              <a:solidFill>
-                <a:schemeClr val="tx1">
-                  <a:lumMod val="50000"/>
-                  <a:lumOff val="50000"/>
-                </a:schemeClr>
-              </a:solidFill>
-              <a:latin typeface="+mj-lt"/>
-            </a:endParaRPr>
           </a:p>
         </p:txBody>
       </p:sp>
@@ -9345,10 +8803,9 @@
           <a:lstStyle/>
           <a:p>
             <a:r>
-              <a:rPr lang="en-US" dirty="0" smtClean="0"/>
+              <a:rPr lang="en-US" dirty="0"/>
               <a:t>All reuse strategies reduce the payload mass fraction</a:t>
             </a:r>
-            <a:endParaRPr lang="en-US" dirty="0"/>
           </a:p>
         </p:txBody>
       </p:sp>
@@ -9567,7 +9024,7 @@
               <a:buNone/>
             </a:pPr>
             <a:r>
-              <a:rPr lang="en-US" dirty="0" smtClean="0">
+              <a:rPr lang="en-US" dirty="0">
                 <a:solidFill>
                   <a:schemeClr val="tx1">
                     <a:lumMod val="50000"/>
@@ -9579,13 +9036,13 @@
               <a:t>Intro | 1. Production costs | </a:t>
             </a:r>
             <a:r>
-              <a:rPr lang="en-US" b="1" dirty="0" smtClean="0">
+              <a:rPr lang="en-US" b="1" dirty="0">
                 <a:latin typeface="+mj-lt"/>
               </a:rPr>
               <a:t>2. Lowest-cost strategy </a:t>
             </a:r>
             <a:r>
-              <a:rPr lang="en-US" dirty="0" smtClean="0">
+              <a:rPr lang="en-US" dirty="0">
                 <a:solidFill>
                   <a:schemeClr val="tx1">
                     <a:lumMod val="50000"/>
@@ -9596,15 +9053,6 @@
               </a:rPr>
               <a:t>| 3. Conditions for reuse viability | Conclusion</a:t>
             </a:r>
-            <a:endParaRPr lang="en-US" dirty="0">
-              <a:solidFill>
-                <a:schemeClr val="tx1">
-                  <a:lumMod val="50000"/>
-                  <a:lumOff val="50000"/>
-                </a:schemeClr>
-              </a:solidFill>
-              <a:latin typeface="+mj-lt"/>
-            </a:endParaRPr>
           </a:p>
         </p:txBody>
       </p:sp>
@@ -9618,13 +9066,6 @@
   <p:clrMapOvr>
     <a:masterClrMapping/>
   </p:clrMapOvr>
-  <p:timing>
-    <p:tnLst>
-      <p:par>
-        <p:cTn id="1" dur="indefinite" restart="never" nodeType="tmRoot"/>
-      </p:par>
-    </p:tnLst>
-  </p:timing>
 </p:sld>
 </file>
 

</xml_diff>